<commit_message>
Update map tutorial to Maps API v2
</commit_message>
<xml_diff>
--- a/android/map/doc/slides.pptx
+++ b/android/map/doc/slides.pptx
@@ -1,23 +1,22 @@
 
 <file path=ppt/presentation.xml><?xml version="1.0" encoding="utf-8"?>
-<p:presentation xmlns:a="http://schemas.openxmlformats.org/drawingml/2006/main" xmlns:r="http://schemas.openxmlformats.org/officeDocument/2006/relationships" xmlns:mc="http://schemas.openxmlformats.org/markup-compatibility/2006" xmlns:mv="urn:schemas-microsoft-com:mac:vml" xmlns:p="http://schemas.openxmlformats.org/presentationml/2006/main" xmlns:c="http://schemas.openxmlformats.org/drawingml/2006/chart" xmlns:dgm="http://schemas.openxmlformats.org/drawingml/2006/diagram" xmlns:o="urn:schemas-microsoft-com:office:office" xmlns:v="urn:schemas-microsoft-com:vml" xmlns:pvml="urn:schemas-microsoft-com:office:powerpoint" xmlns:com="http://schemas.openxmlformats.org/drawingml/2006/compatibility" xmlns:p14="http://schemas.microsoft.com/office/powerpoint/2010/main" saveSubsetFonts="1" autoCompressPictures="0" strictFirstAndLastChars="0" showSpecialPlsOnTitleSld="0" firstSlideNum="0">
+<p:presentation xmlns:a="http://schemas.openxmlformats.org/drawingml/2006/main" xmlns:r="http://schemas.openxmlformats.org/officeDocument/2006/relationships" xmlns:p="http://schemas.openxmlformats.org/presentationml/2006/main" firstSlideNum="0" showSpecialPlsOnTitleSld="0" strictFirstAndLastChars="0" saveSubsetFonts="1" autoCompressPictures="0">
   <p:sldMasterIdLst>
-    <p:sldMasterId id="2147483653" r:id="rId4"/>
+    <p:sldMasterId id="2147483653" r:id="rId1"/>
   </p:sldMasterIdLst>
   <p:notesMasterIdLst>
-    <p:notesMasterId r:id="rId5"/>
+    <p:notesMasterId r:id="rId6"/>
   </p:notesMasterIdLst>
   <p:sldIdLst>
-    <p:sldId id="256" r:id="rId6"/>
-    <p:sldId id="257" r:id="rId7"/>
-    <p:sldId id="258" r:id="rId8"/>
-    <p:sldId id="259" r:id="rId9"/>
-    <p:sldId id="260" r:id="rId10"/>
+    <p:sldId id="256" r:id="rId2"/>
+    <p:sldId id="258" r:id="rId3"/>
+    <p:sldId id="259" r:id="rId4"/>
+    <p:sldId id="260" r:id="rId5"/>
   </p:sldIdLst>
-  <p:sldSz cy="7620000" cx="10160000"/>
-  <p:notesSz cy="10160000" cx="7620000"/>
+  <p:sldSz cx="10160000" cy="7620000"/>
+  <p:notesSz cx="7620000" cy="10160000"/>
   <p:defaultTextStyle>
-    <a:defPPr algn="l" rtl="0" marR="0">
+    <a:defPPr marR="0" algn="l" rtl="0">
       <a:lnSpc>
         <a:spcPct val="100000"/>
       </a:lnSpc>
@@ -28,7 +27,7 @@
         <a:spcPts val="0"/>
       </a:spcAft>
     </a:defPPr>
-    <a:lvl1pPr algn="l" rtl="0" marR="0">
+    <a:lvl1pPr marR="0" algn="l" rtl="0">
       <a:lnSpc>
         <a:spcPct val="100000"/>
       </a:lnSpc>
@@ -39,7 +38,7 @@
         <a:spcPts val="0"/>
       </a:spcAft>
       <a:buNone/>
-      <a:defRPr strike="noStrike" u="none" b="0" cap="none" baseline="0" sz="1400" i="0">
+      <a:defRPr sz="1400" b="0" i="0" u="none" strike="noStrike" cap="none" baseline="0">
         <a:solidFill>
           <a:srgbClr val="000000"/>
         </a:solidFill>
@@ -50,7 +49,7 @@
         <a:rtl val="0"/>
       </a:defRPr>
     </a:lvl1pPr>
-    <a:lvl2pPr algn="l" rtl="0" marR="0">
+    <a:lvl2pPr marR="0" algn="l" rtl="0">
       <a:lnSpc>
         <a:spcPct val="100000"/>
       </a:lnSpc>
@@ -61,7 +60,7 @@
         <a:spcPts val="0"/>
       </a:spcAft>
       <a:buNone/>
-      <a:defRPr strike="noStrike" u="none" b="0" cap="none" baseline="0" sz="1400" i="0">
+      <a:defRPr sz="1400" b="0" i="0" u="none" strike="noStrike" cap="none" baseline="0">
         <a:solidFill>
           <a:srgbClr val="000000"/>
         </a:solidFill>
@@ -72,7 +71,7 @@
         <a:rtl val="0"/>
       </a:defRPr>
     </a:lvl2pPr>
-    <a:lvl3pPr algn="l" rtl="0" marR="0">
+    <a:lvl3pPr marR="0" algn="l" rtl="0">
       <a:lnSpc>
         <a:spcPct val="100000"/>
       </a:lnSpc>
@@ -83,7 +82,7 @@
         <a:spcPts val="0"/>
       </a:spcAft>
       <a:buNone/>
-      <a:defRPr strike="noStrike" u="none" b="0" cap="none" baseline="0" sz="1400" i="0">
+      <a:defRPr sz="1400" b="0" i="0" u="none" strike="noStrike" cap="none" baseline="0">
         <a:solidFill>
           <a:srgbClr val="000000"/>
         </a:solidFill>
@@ -94,7 +93,7 @@
         <a:rtl val="0"/>
       </a:defRPr>
     </a:lvl3pPr>
-    <a:lvl4pPr algn="l" rtl="0" marR="0">
+    <a:lvl4pPr marR="0" algn="l" rtl="0">
       <a:lnSpc>
         <a:spcPct val="100000"/>
       </a:lnSpc>
@@ -105,7 +104,7 @@
         <a:spcPts val="0"/>
       </a:spcAft>
       <a:buNone/>
-      <a:defRPr strike="noStrike" u="none" b="0" cap="none" baseline="0" sz="1400" i="0">
+      <a:defRPr sz="1400" b="0" i="0" u="none" strike="noStrike" cap="none" baseline="0">
         <a:solidFill>
           <a:srgbClr val="000000"/>
         </a:solidFill>
@@ -116,7 +115,7 @@
         <a:rtl val="0"/>
       </a:defRPr>
     </a:lvl4pPr>
-    <a:lvl5pPr algn="l" rtl="0" marR="0">
+    <a:lvl5pPr marR="0" algn="l" rtl="0">
       <a:lnSpc>
         <a:spcPct val="100000"/>
       </a:lnSpc>
@@ -127,7 +126,7 @@
         <a:spcPts val="0"/>
       </a:spcAft>
       <a:buNone/>
-      <a:defRPr strike="noStrike" u="none" b="0" cap="none" baseline="0" sz="1400" i="0">
+      <a:defRPr sz="1400" b="0" i="0" u="none" strike="noStrike" cap="none" baseline="0">
         <a:solidFill>
           <a:srgbClr val="000000"/>
         </a:solidFill>
@@ -138,7 +137,7 @@
         <a:rtl val="0"/>
       </a:defRPr>
     </a:lvl5pPr>
-    <a:lvl6pPr algn="l" rtl="0" marR="0">
+    <a:lvl6pPr marR="0" algn="l" rtl="0">
       <a:lnSpc>
         <a:spcPct val="100000"/>
       </a:lnSpc>
@@ -149,7 +148,7 @@
         <a:spcPts val="0"/>
       </a:spcAft>
       <a:buNone/>
-      <a:defRPr strike="noStrike" u="none" b="0" cap="none" baseline="0" sz="1400" i="0">
+      <a:defRPr sz="1400" b="0" i="0" u="none" strike="noStrike" cap="none" baseline="0">
         <a:solidFill>
           <a:srgbClr val="000000"/>
         </a:solidFill>
@@ -160,7 +159,7 @@
         <a:rtl val="0"/>
       </a:defRPr>
     </a:lvl6pPr>
-    <a:lvl7pPr algn="l" rtl="0" marR="0">
+    <a:lvl7pPr marR="0" algn="l" rtl="0">
       <a:lnSpc>
         <a:spcPct val="100000"/>
       </a:lnSpc>
@@ -171,7 +170,7 @@
         <a:spcPts val="0"/>
       </a:spcAft>
       <a:buNone/>
-      <a:defRPr strike="noStrike" u="none" b="0" cap="none" baseline="0" sz="1400" i="0">
+      <a:defRPr sz="1400" b="0" i="0" u="none" strike="noStrike" cap="none" baseline="0">
         <a:solidFill>
           <a:srgbClr val="000000"/>
         </a:solidFill>
@@ -182,7 +181,7 @@
         <a:rtl val="0"/>
       </a:defRPr>
     </a:lvl7pPr>
-    <a:lvl8pPr algn="l" rtl="0" marR="0">
+    <a:lvl8pPr marR="0" algn="l" rtl="0">
       <a:lnSpc>
         <a:spcPct val="100000"/>
       </a:lnSpc>
@@ -193,7 +192,7 @@
         <a:spcPts val="0"/>
       </a:spcAft>
       <a:buNone/>
-      <a:defRPr strike="noStrike" u="none" b="0" cap="none" baseline="0" sz="1400" i="0">
+      <a:defRPr sz="1400" b="0" i="0" u="none" strike="noStrike" cap="none" baseline="0">
         <a:solidFill>
           <a:srgbClr val="000000"/>
         </a:solidFill>
@@ -204,7 +203,7 @@
         <a:rtl val="0"/>
       </a:defRPr>
     </a:lvl8pPr>
-    <a:lvl9pPr algn="l" rtl="0" marR="0">
+    <a:lvl9pPr marR="0" algn="l" rtl="0">
       <a:lnSpc>
         <a:spcPct val="100000"/>
       </a:lnSpc>
@@ -215,7 +214,7 @@
         <a:spcPts val="0"/>
       </a:spcAft>
       <a:buNone/>
-      <a:defRPr strike="noStrike" u="none" b="0" cap="none" baseline="0" sz="1400" i="0">
+      <a:defRPr sz="1400" b="0" i="0" u="none" strike="noStrike" cap="none" baseline="0">
         <a:solidFill>
           <a:srgbClr val="000000"/>
         </a:solidFill>
@@ -231,8 +230,13 @@
 </file>
 
 <file path=ppt/notesMasters/notesMaster1.xml><?xml version="1.0" encoding="utf-8"?>
-<p:notesMaster xmlns:a="http://schemas.openxmlformats.org/drawingml/2006/main" xmlns:r="http://schemas.openxmlformats.org/officeDocument/2006/relationships" xmlns:mc="http://schemas.openxmlformats.org/markup-compatibility/2006" xmlns:mv="urn:schemas-microsoft-com:mac:vml" xmlns:p="http://schemas.openxmlformats.org/presentationml/2006/main" xmlns:c="http://schemas.openxmlformats.org/drawingml/2006/chart" xmlns:dgm="http://schemas.openxmlformats.org/drawingml/2006/diagram" xmlns:o="urn:schemas-microsoft-com:office:office" xmlns:v="urn:schemas-microsoft-com:vml" xmlns:pvml="urn:schemas-microsoft-com:office:powerpoint" xmlns:com="http://schemas.openxmlformats.org/drawingml/2006/compatibility" xmlns:p14="http://schemas.microsoft.com/office/powerpoint/2010/main">
+<p:notesMaster xmlns:a="http://schemas.openxmlformats.org/drawingml/2006/main" xmlns:r="http://schemas.openxmlformats.org/officeDocument/2006/relationships" xmlns:p="http://schemas.openxmlformats.org/presentationml/2006/main">
   <p:cSld>
+    <p:bg>
+      <p:bgRef idx="1001">
+        <a:schemeClr val="bg1"/>
+      </p:bgRef>
+    </p:bg>
     <p:spTree>
       <p:nvGrpSpPr>
         <p:cNvPr id="1" name="Shape 1"/>
@@ -241,39 +245,46 @@
       </p:nvGrpSpPr>
       <p:grpSpPr>
         <a:xfrm>
-          <a:off y="0" x="0"/>
-          <a:ext cy="0" cx="0"/>
-          <a:chOff y="0" x="0"/>
-          <a:chExt cy="0" cx="0"/>
+          <a:off x="0" y="0"/>
+          <a:ext cx="0" cy="0"/>
+          <a:chOff x="0" y="0"/>
+          <a:chExt cx="0" cy="0"/>
         </a:xfrm>
       </p:grpSpPr>
       <p:sp>
         <p:nvSpPr>
           <p:cNvPr id="2" name="Shape 2"/>
-          <p:cNvSpPr/>
+          <p:cNvSpPr>
+            <a:spLocks noGrp="1" noRot="1" noChangeAspect="1"/>
+          </p:cNvSpPr>
           <p:nvPr>
-            <p:ph idx="2" type="sldImg"/>
+            <p:ph type="sldImg" idx="2"/>
           </p:nvPr>
         </p:nvSpPr>
         <p:spPr>
           <a:xfrm>
-            <a:off y="762000" x="1270250"/>
-            <a:ext cy="3809999" cx="5080250"/>
+            <a:off x="1270250" y="762000"/>
+            <a:ext cx="5080250" cy="3809999"/>
           </a:xfrm>
           <a:custGeom>
+            <a:avLst/>
+            <a:gdLst/>
+            <a:ahLst/>
+            <a:cxnLst/>
+            <a:rect l="0" t="0" r="0" b="0"/>
             <a:pathLst>
-              <a:path w="120000" extrusionOk="0" h="120000">
+              <a:path w="120000" h="120000" extrusionOk="0">
                 <a:moveTo>
-                  <a:pt y="0" x="0"/>
+                  <a:pt x="0" y="0"/>
                 </a:moveTo>
                 <a:lnTo>
-                  <a:pt y="0" x="120000"/>
+                  <a:pt x="120000" y="0"/>
                 </a:lnTo>
                 <a:lnTo>
-                  <a:pt y="120000" x="120000"/>
+                  <a:pt x="120000" y="120000"/>
                 </a:lnTo>
                 <a:lnTo>
-                  <a:pt y="120000" x="0"/>
+                  <a:pt x="0" y="120000"/>
                 </a:lnTo>
                 <a:close/>
               </a:path>
@@ -286,23 +297,25 @@
             </a:solidFill>
             <a:prstDash val="solid"/>
             <a:round/>
-            <a:headEnd w="med" len="med" type="none"/>
-            <a:tailEnd w="med" len="med" type="none"/>
+            <a:headEnd type="none" w="med" len="med"/>
+            <a:tailEnd type="none" w="med" len="med"/>
           </a:ln>
         </p:spPr>
       </p:sp>
       <p:sp>
         <p:nvSpPr>
           <p:cNvPr id="3" name="Shape 3"/>
-          <p:cNvSpPr txBox="1"/>
+          <p:cNvSpPr txBox="1">
+            <a:spLocks noGrp="1"/>
+          </p:cNvSpPr>
           <p:nvPr>
-            <p:ph idx="1" type="body"/>
+            <p:ph type="body" idx="1"/>
           </p:nvPr>
         </p:nvSpPr>
         <p:spPr>
           <a:xfrm>
-            <a:off y="4826000" x="762000"/>
-            <a:ext cy="4572000" cx="6096000"/>
+            <a:off x="762000" y="4826000"/>
+            <a:ext cx="6096000" cy="4572000"/>
           </a:xfrm>
           <a:prstGeom prst="rect">
             <a:avLst/>
@@ -313,7 +326,7 @@
           </a:ln>
         </p:spPr>
         <p:txBody>
-          <a:bodyPr bIns="91425" rIns="91425" lIns="91425" tIns="91425" anchor="t" anchorCtr="0"/>
+          <a:bodyPr lIns="91425" tIns="91425" rIns="91425" bIns="91425" anchor="t" anchorCtr="0"/>
           <a:lstStyle>
             <a:lvl1pPr>
               <a:spcBef>
@@ -370,59 +383,165 @@
               <a:defRPr sz="1100"/>
             </a:lvl9pPr>
           </a:lstStyle>
-          <a:p/>
+          <a:p>
+            <a:endParaRPr/>
+          </a:p>
         </p:txBody>
       </p:sp>
     </p:spTree>
+    <p:extLst>
+      <p:ext uri="{BB962C8B-B14F-4D97-AF65-F5344CB8AC3E}">
+        <p14:creationId xmlns:p14="http://schemas.microsoft.com/office/powerpoint/2010/main" val="469339349"/>
+      </p:ext>
+    </p:extLst>
   </p:cSld>
-  <p:clrMap accent2="accent2" accent3="accent3" accent4="accent4" accent5="accent5" accent6="accent6" hlink="hlink" tx2="lt2" tx1="dk1" bg2="dk2" bg1="lt1" folHlink="folHlink" accent1="accent1"/>
+  <p:clrMap bg1="lt1" tx1="dk1" bg2="dk2" tx2="lt2" accent1="accent1" accent2="accent2" accent3="accent3" accent4="accent4" accent5="accent5" accent6="accent6" hlink="hlink" folHlink="folHlink"/>
+  <p:notesStyle>
+    <a:lvl1pPr marL="0" algn="l" defTabSz="457200" rtl="0" eaLnBrk="1" latinLnBrk="0" hangingPunct="1">
+      <a:defRPr sz="1200" kern="1200">
+        <a:solidFill>
+          <a:schemeClr val="tx1"/>
+        </a:solidFill>
+        <a:latin typeface="+mn-lt"/>
+        <a:ea typeface="+mn-ea"/>
+        <a:cs typeface="+mn-cs"/>
+      </a:defRPr>
+    </a:lvl1pPr>
+    <a:lvl2pPr marL="457200" algn="l" defTabSz="457200" rtl="0" eaLnBrk="1" latinLnBrk="0" hangingPunct="1">
+      <a:defRPr sz="1200" kern="1200">
+        <a:solidFill>
+          <a:schemeClr val="tx1"/>
+        </a:solidFill>
+        <a:latin typeface="+mn-lt"/>
+        <a:ea typeface="+mn-ea"/>
+        <a:cs typeface="+mn-cs"/>
+      </a:defRPr>
+    </a:lvl2pPr>
+    <a:lvl3pPr marL="914400" algn="l" defTabSz="457200" rtl="0" eaLnBrk="1" latinLnBrk="0" hangingPunct="1">
+      <a:defRPr sz="1200" kern="1200">
+        <a:solidFill>
+          <a:schemeClr val="tx1"/>
+        </a:solidFill>
+        <a:latin typeface="+mn-lt"/>
+        <a:ea typeface="+mn-ea"/>
+        <a:cs typeface="+mn-cs"/>
+      </a:defRPr>
+    </a:lvl3pPr>
+    <a:lvl4pPr marL="1371600" algn="l" defTabSz="457200" rtl="0" eaLnBrk="1" latinLnBrk="0" hangingPunct="1">
+      <a:defRPr sz="1200" kern="1200">
+        <a:solidFill>
+          <a:schemeClr val="tx1"/>
+        </a:solidFill>
+        <a:latin typeface="+mn-lt"/>
+        <a:ea typeface="+mn-ea"/>
+        <a:cs typeface="+mn-cs"/>
+      </a:defRPr>
+    </a:lvl4pPr>
+    <a:lvl5pPr marL="1828800" algn="l" defTabSz="457200" rtl="0" eaLnBrk="1" latinLnBrk="0" hangingPunct="1">
+      <a:defRPr sz="1200" kern="1200">
+        <a:solidFill>
+          <a:schemeClr val="tx1"/>
+        </a:solidFill>
+        <a:latin typeface="+mn-lt"/>
+        <a:ea typeface="+mn-ea"/>
+        <a:cs typeface="+mn-cs"/>
+      </a:defRPr>
+    </a:lvl5pPr>
+    <a:lvl6pPr marL="2286000" algn="l" defTabSz="457200" rtl="0" eaLnBrk="1" latinLnBrk="0" hangingPunct="1">
+      <a:defRPr sz="1200" kern="1200">
+        <a:solidFill>
+          <a:schemeClr val="tx1"/>
+        </a:solidFill>
+        <a:latin typeface="+mn-lt"/>
+        <a:ea typeface="+mn-ea"/>
+        <a:cs typeface="+mn-cs"/>
+      </a:defRPr>
+    </a:lvl6pPr>
+    <a:lvl7pPr marL="2743200" algn="l" defTabSz="457200" rtl="0" eaLnBrk="1" latinLnBrk="0" hangingPunct="1">
+      <a:defRPr sz="1200" kern="1200">
+        <a:solidFill>
+          <a:schemeClr val="tx1"/>
+        </a:solidFill>
+        <a:latin typeface="+mn-lt"/>
+        <a:ea typeface="+mn-ea"/>
+        <a:cs typeface="+mn-cs"/>
+      </a:defRPr>
+    </a:lvl7pPr>
+    <a:lvl8pPr marL="3200400" algn="l" defTabSz="457200" rtl="0" eaLnBrk="1" latinLnBrk="0" hangingPunct="1">
+      <a:defRPr sz="1200" kern="1200">
+        <a:solidFill>
+          <a:schemeClr val="tx1"/>
+        </a:solidFill>
+        <a:latin typeface="+mn-lt"/>
+        <a:ea typeface="+mn-ea"/>
+        <a:cs typeface="+mn-cs"/>
+      </a:defRPr>
+    </a:lvl8pPr>
+    <a:lvl9pPr marL="3657600" algn="l" defTabSz="457200" rtl="0" eaLnBrk="1" latinLnBrk="0" hangingPunct="1">
+      <a:defRPr sz="1200" kern="1200">
+        <a:solidFill>
+          <a:schemeClr val="tx1"/>
+        </a:solidFill>
+        <a:latin typeface="+mn-lt"/>
+        <a:ea typeface="+mn-ea"/>
+        <a:cs typeface="+mn-cs"/>
+      </a:defRPr>
+    </a:lvl9pPr>
+  </p:notesStyle>
 </p:notesMaster>
 </file>
 
 <file path=ppt/notesSlides/notesSlide1.xml><?xml version="1.0" encoding="utf-8"?>
-<p:notes xmlns:a="http://schemas.openxmlformats.org/drawingml/2006/main" xmlns:r="http://schemas.openxmlformats.org/officeDocument/2006/relationships" xmlns:mc="http://schemas.openxmlformats.org/markup-compatibility/2006" xmlns:mv="urn:schemas-microsoft-com:mac:vml" xmlns:p="http://schemas.openxmlformats.org/presentationml/2006/main" xmlns:c="http://schemas.openxmlformats.org/drawingml/2006/chart" xmlns:dgm="http://schemas.openxmlformats.org/drawingml/2006/diagram" xmlns:o="urn:schemas-microsoft-com:office:office" xmlns:v="urn:schemas-microsoft-com:vml" xmlns:pvml="urn:schemas-microsoft-com:office:powerpoint" xmlns:com="http://schemas.openxmlformats.org/drawingml/2006/compatibility" xmlns:p14="http://schemas.microsoft.com/office/powerpoint/2010/main" showMasterSp="0" showMasterPhAnim="0">
+<p:notes xmlns:a="http://schemas.openxmlformats.org/drawingml/2006/main" xmlns:r="http://schemas.openxmlformats.org/officeDocument/2006/relationships" xmlns:p="http://schemas.openxmlformats.org/presentationml/2006/main" showMasterSp="0" showMasterPhAnim="0">
   <p:cSld>
     <p:spTree>
       <p:nvGrpSpPr>
-        <p:cNvPr id="22" name="Shape 22"/>
+        <p:cNvPr id="1" name="Shape 22"/>
         <p:cNvGrpSpPr/>
         <p:nvPr/>
       </p:nvGrpSpPr>
       <p:grpSpPr>
         <a:xfrm>
-          <a:off y="0" x="0"/>
-          <a:ext cy="0" cx="0"/>
-          <a:chOff y="0" x="0"/>
-          <a:chExt cy="0" cx="0"/>
+          <a:off x="0" y="0"/>
+          <a:ext cx="0" cy="0"/>
+          <a:chOff x="0" y="0"/>
+          <a:chExt cx="0" cy="0"/>
         </a:xfrm>
       </p:grpSpPr>
       <p:sp>
         <p:nvSpPr>
           <p:cNvPr id="23" name="Shape 23"/>
-          <p:cNvSpPr/>
+          <p:cNvSpPr>
+            <a:spLocks noGrp="1" noRot="1" noChangeAspect="1"/>
+          </p:cNvSpPr>
           <p:nvPr>
-            <p:ph idx="2" type="sldImg"/>
+            <p:ph type="sldImg" idx="2"/>
           </p:nvPr>
         </p:nvSpPr>
         <p:spPr>
           <a:xfrm>
-            <a:off y="762000" x="1270250"/>
-            <a:ext cy="3809999" cx="5080250"/>
+            <a:off x="1270000" y="762000"/>
+            <a:ext cx="5080000" cy="3810000"/>
           </a:xfrm>
           <a:custGeom>
+            <a:avLst/>
+            <a:gdLst/>
+            <a:ahLst/>
+            <a:cxnLst/>
+            <a:rect l="0" t="0" r="0" b="0"/>
             <a:pathLst>
-              <a:path w="120000" extrusionOk="0" h="120000">
+              <a:path w="120000" h="120000" extrusionOk="0">
                 <a:moveTo>
-                  <a:pt y="0" x="0"/>
+                  <a:pt x="0" y="0"/>
                 </a:moveTo>
                 <a:lnTo>
-                  <a:pt y="0" x="120000"/>
+                  <a:pt x="120000" y="0"/>
                 </a:lnTo>
                 <a:lnTo>
-                  <a:pt y="120000" x="120000"/>
+                  <a:pt x="120000" y="120000"/>
                 </a:lnTo>
                 <a:lnTo>
-                  <a:pt y="120000" x="0"/>
+                  <a:pt x="0" y="120000"/>
                 </a:lnTo>
                 <a:close/>
               </a:path>
@@ -435,30 +554,32 @@
             </a:solidFill>
             <a:prstDash val="solid"/>
             <a:round/>
-            <a:headEnd w="med" len="med" type="none"/>
-            <a:tailEnd w="med" len="med" type="none"/>
+            <a:headEnd type="none" w="med" len="med"/>
+            <a:tailEnd type="none" w="med" len="med"/>
           </a:ln>
         </p:spPr>
       </p:sp>
       <p:sp>
         <p:nvSpPr>
           <p:cNvPr id="24" name="Shape 24"/>
-          <p:cNvSpPr txBox="1"/>
+          <p:cNvSpPr txBox="1">
+            <a:spLocks noGrp="1"/>
+          </p:cNvSpPr>
           <p:nvPr>
-            <p:ph idx="1" type="body"/>
+            <p:ph type="body" idx="1"/>
           </p:nvPr>
         </p:nvSpPr>
         <p:spPr>
           <a:xfrm>
-            <a:off y="4826000" x="762000"/>
-            <a:ext cy="4572000" cx="6096000"/>
+            <a:off x="762000" y="4826000"/>
+            <a:ext cx="6096000" cy="4572000"/>
           </a:xfrm>
           <a:prstGeom prst="rect">
             <a:avLst/>
           </a:prstGeom>
         </p:spPr>
         <p:txBody>
-          <a:bodyPr bIns="91425" rIns="91425" lIns="91425" tIns="91425" anchor="t" anchorCtr="0">
+          <a:bodyPr lIns="91425" tIns="91425" rIns="91425" bIns="91425" anchor="t" anchorCtr="0">
             <a:noAutofit/>
           </a:bodyPr>
           <a:lstStyle/>
@@ -469,9 +590,6 @@
               </a:spcBef>
               <a:buNone/>
             </a:pPr>
-            <a:r>
-              <a:t/>
-            </a:r>
             <a:endParaRPr sz="1466"/>
           </a:p>
         </p:txBody>
@@ -485,49 +603,56 @@
 </file>
 
 <file path=ppt/notesSlides/notesSlide2.xml><?xml version="1.0" encoding="utf-8"?>
-<p:notes xmlns:a="http://schemas.openxmlformats.org/drawingml/2006/main" xmlns:r="http://schemas.openxmlformats.org/officeDocument/2006/relationships" xmlns:mc="http://schemas.openxmlformats.org/markup-compatibility/2006" xmlns:mv="urn:schemas-microsoft-com:mac:vml" xmlns:p="http://schemas.openxmlformats.org/presentationml/2006/main" xmlns:c="http://schemas.openxmlformats.org/drawingml/2006/chart" xmlns:dgm="http://schemas.openxmlformats.org/drawingml/2006/diagram" xmlns:o="urn:schemas-microsoft-com:office:office" xmlns:v="urn:schemas-microsoft-com:vml" xmlns:pvml="urn:schemas-microsoft-com:office:powerpoint" xmlns:com="http://schemas.openxmlformats.org/drawingml/2006/compatibility" xmlns:p14="http://schemas.microsoft.com/office/powerpoint/2010/main" showMasterSp="0" showMasterPhAnim="0">
+<p:notes xmlns:a="http://schemas.openxmlformats.org/drawingml/2006/main" xmlns:r="http://schemas.openxmlformats.org/officeDocument/2006/relationships" xmlns:p="http://schemas.openxmlformats.org/presentationml/2006/main" showMasterSp="0" showMasterPhAnim="0">
   <p:cSld>
     <p:spTree>
       <p:nvGrpSpPr>
-        <p:cNvPr id="27" name="Shape 27"/>
+        <p:cNvPr id="1" name="Shape 33"/>
         <p:cNvGrpSpPr/>
         <p:nvPr/>
       </p:nvGrpSpPr>
       <p:grpSpPr>
         <a:xfrm>
-          <a:off y="0" x="0"/>
-          <a:ext cy="0" cx="0"/>
-          <a:chOff y="0" x="0"/>
-          <a:chExt cy="0" cx="0"/>
+          <a:off x="0" y="0"/>
+          <a:ext cx="0" cy="0"/>
+          <a:chOff x="0" y="0"/>
+          <a:chExt cx="0" cy="0"/>
         </a:xfrm>
       </p:grpSpPr>
       <p:sp>
         <p:nvSpPr>
-          <p:cNvPr id="28" name="Shape 28"/>
-          <p:cNvSpPr/>
+          <p:cNvPr id="34" name="Shape 34"/>
+          <p:cNvSpPr>
+            <a:spLocks noGrp="1" noRot="1" noChangeAspect="1"/>
+          </p:cNvSpPr>
           <p:nvPr>
-            <p:ph idx="2" type="sldImg"/>
+            <p:ph type="sldImg" idx="2"/>
           </p:nvPr>
         </p:nvSpPr>
         <p:spPr>
           <a:xfrm>
-            <a:off y="762000" x="1270250"/>
-            <a:ext cy="3809999" cx="5080250"/>
+            <a:off x="1270250" y="762000"/>
+            <a:ext cx="5080250" cy="3809999"/>
           </a:xfrm>
           <a:custGeom>
+            <a:avLst/>
+            <a:gdLst/>
+            <a:ahLst/>
+            <a:cxnLst/>
+            <a:rect l="0" t="0" r="0" b="0"/>
             <a:pathLst>
-              <a:path w="120000" extrusionOk="0" h="120000">
+              <a:path w="120000" h="120000" extrusionOk="0">
                 <a:moveTo>
-                  <a:pt y="0" x="0"/>
+                  <a:pt x="0" y="0"/>
                 </a:moveTo>
                 <a:lnTo>
-                  <a:pt y="0" x="120000"/>
+                  <a:pt x="120000" y="0"/>
                 </a:lnTo>
                 <a:lnTo>
-                  <a:pt y="120000" x="120000"/>
+                  <a:pt x="120000" y="120000"/>
                 </a:lnTo>
                 <a:lnTo>
-                  <a:pt y="120000" x="0"/>
+                  <a:pt x="0" y="120000"/>
                 </a:lnTo>
                 <a:close/>
               </a:path>
@@ -540,30 +665,32 @@
             </a:solidFill>
             <a:prstDash val="solid"/>
             <a:round/>
-            <a:headEnd w="med" len="med" type="none"/>
-            <a:tailEnd w="med" len="med" type="none"/>
+            <a:headEnd type="none" w="med" len="med"/>
+            <a:tailEnd type="none" w="med" len="med"/>
           </a:ln>
         </p:spPr>
       </p:sp>
       <p:sp>
         <p:nvSpPr>
-          <p:cNvPr id="29" name="Shape 29"/>
-          <p:cNvSpPr txBox="1"/>
+          <p:cNvPr id="35" name="Shape 35"/>
+          <p:cNvSpPr txBox="1">
+            <a:spLocks noGrp="1"/>
+          </p:cNvSpPr>
           <p:nvPr>
-            <p:ph idx="1" type="body"/>
+            <p:ph type="body" idx="1"/>
           </p:nvPr>
         </p:nvSpPr>
         <p:spPr>
           <a:xfrm>
-            <a:off y="4826000" x="762000"/>
-            <a:ext cy="4572000" cx="6096000"/>
+            <a:off x="762000" y="4826000"/>
+            <a:ext cx="6096000" cy="4572000"/>
           </a:xfrm>
           <a:prstGeom prst="rect">
             <a:avLst/>
           </a:prstGeom>
         </p:spPr>
         <p:txBody>
-          <a:bodyPr bIns="91425" rIns="91425" lIns="91425" tIns="91425" anchor="t" anchorCtr="0">
+          <a:bodyPr lIns="91425" tIns="91425" rIns="91425" bIns="91425" anchor="t" anchorCtr="0">
             <a:noAutofit/>
           </a:bodyPr>
           <a:lstStyle/>
@@ -574,9 +701,6 @@
               </a:spcBef>
               <a:buNone/>
             </a:pPr>
-            <a:r>
-              <a:t/>
-            </a:r>
             <a:endParaRPr sz="1466"/>
           </a:p>
         </p:txBody>
@@ -590,49 +714,56 @@
 </file>
 
 <file path=ppt/notesSlides/notesSlide3.xml><?xml version="1.0" encoding="utf-8"?>
-<p:notes xmlns:a="http://schemas.openxmlformats.org/drawingml/2006/main" xmlns:r="http://schemas.openxmlformats.org/officeDocument/2006/relationships" xmlns:mc="http://schemas.openxmlformats.org/markup-compatibility/2006" xmlns:mv="urn:schemas-microsoft-com:mac:vml" xmlns:p="http://schemas.openxmlformats.org/presentationml/2006/main" xmlns:c="http://schemas.openxmlformats.org/drawingml/2006/chart" xmlns:dgm="http://schemas.openxmlformats.org/drawingml/2006/diagram" xmlns:o="urn:schemas-microsoft-com:office:office" xmlns:v="urn:schemas-microsoft-com:vml" xmlns:pvml="urn:schemas-microsoft-com:office:powerpoint" xmlns:com="http://schemas.openxmlformats.org/drawingml/2006/compatibility" xmlns:p14="http://schemas.microsoft.com/office/powerpoint/2010/main" showMasterSp="0" showMasterPhAnim="0">
+<p:notes xmlns:a="http://schemas.openxmlformats.org/drawingml/2006/main" xmlns:r="http://schemas.openxmlformats.org/officeDocument/2006/relationships" xmlns:p="http://schemas.openxmlformats.org/presentationml/2006/main" showMasterSp="0" showMasterPhAnim="0">
   <p:cSld>
     <p:spTree>
       <p:nvGrpSpPr>
-        <p:cNvPr id="33" name="Shape 33"/>
+        <p:cNvPr id="1" name="Shape 39"/>
         <p:cNvGrpSpPr/>
         <p:nvPr/>
       </p:nvGrpSpPr>
       <p:grpSpPr>
         <a:xfrm>
-          <a:off y="0" x="0"/>
-          <a:ext cy="0" cx="0"/>
-          <a:chOff y="0" x="0"/>
-          <a:chExt cy="0" cx="0"/>
+          <a:off x="0" y="0"/>
+          <a:ext cx="0" cy="0"/>
+          <a:chOff x="0" y="0"/>
+          <a:chExt cx="0" cy="0"/>
         </a:xfrm>
       </p:grpSpPr>
       <p:sp>
         <p:nvSpPr>
-          <p:cNvPr id="34" name="Shape 34"/>
-          <p:cNvSpPr/>
+          <p:cNvPr id="40" name="Shape 40"/>
+          <p:cNvSpPr>
+            <a:spLocks noGrp="1" noRot="1" noChangeAspect="1"/>
+          </p:cNvSpPr>
           <p:nvPr>
-            <p:ph idx="2" type="sldImg"/>
+            <p:ph type="sldImg" idx="2"/>
           </p:nvPr>
         </p:nvSpPr>
         <p:spPr>
           <a:xfrm>
-            <a:off y="762000" x="1270250"/>
-            <a:ext cy="3809999" cx="5080250"/>
+            <a:off x="1270000" y="762000"/>
+            <a:ext cx="5080000" cy="3810000"/>
           </a:xfrm>
           <a:custGeom>
+            <a:avLst/>
+            <a:gdLst/>
+            <a:ahLst/>
+            <a:cxnLst/>
+            <a:rect l="0" t="0" r="0" b="0"/>
             <a:pathLst>
-              <a:path w="120000" extrusionOk="0" h="120000">
+              <a:path w="120000" h="120000" extrusionOk="0">
                 <a:moveTo>
-                  <a:pt y="0" x="0"/>
+                  <a:pt x="0" y="0"/>
                 </a:moveTo>
                 <a:lnTo>
-                  <a:pt y="0" x="120000"/>
+                  <a:pt x="120000" y="0"/>
                 </a:lnTo>
                 <a:lnTo>
-                  <a:pt y="120000" x="120000"/>
+                  <a:pt x="120000" y="120000"/>
                 </a:lnTo>
                 <a:lnTo>
-                  <a:pt y="120000" x="0"/>
+                  <a:pt x="0" y="120000"/>
                 </a:lnTo>
                 <a:close/>
               </a:path>
@@ -645,30 +776,32 @@
             </a:solidFill>
             <a:prstDash val="solid"/>
             <a:round/>
-            <a:headEnd w="med" len="med" type="none"/>
-            <a:tailEnd w="med" len="med" type="none"/>
+            <a:headEnd type="none" w="med" len="med"/>
+            <a:tailEnd type="none" w="med" len="med"/>
           </a:ln>
         </p:spPr>
       </p:sp>
       <p:sp>
         <p:nvSpPr>
-          <p:cNvPr id="35" name="Shape 35"/>
-          <p:cNvSpPr txBox="1"/>
+          <p:cNvPr id="41" name="Shape 41"/>
+          <p:cNvSpPr txBox="1">
+            <a:spLocks noGrp="1"/>
+          </p:cNvSpPr>
           <p:nvPr>
-            <p:ph idx="1" type="body"/>
+            <p:ph type="body" idx="1"/>
           </p:nvPr>
         </p:nvSpPr>
         <p:spPr>
           <a:xfrm>
-            <a:off y="4826000" x="762000"/>
-            <a:ext cy="4572000" cx="6096000"/>
+            <a:off x="762000" y="4826000"/>
+            <a:ext cx="6096000" cy="4572000"/>
           </a:xfrm>
           <a:prstGeom prst="rect">
             <a:avLst/>
           </a:prstGeom>
         </p:spPr>
         <p:txBody>
-          <a:bodyPr bIns="91425" rIns="91425" lIns="91425" tIns="91425" anchor="t" anchorCtr="0">
+          <a:bodyPr lIns="91425" tIns="91425" rIns="91425" bIns="91425" anchor="t" anchorCtr="0">
             <a:noAutofit/>
           </a:bodyPr>
           <a:lstStyle/>
@@ -679,9 +812,6 @@
               </a:spcBef>
               <a:buNone/>
             </a:pPr>
-            <a:r>
-              <a:t/>
-            </a:r>
             <a:endParaRPr sz="1466"/>
           </a:p>
         </p:txBody>
@@ -695,49 +825,56 @@
 </file>
 
 <file path=ppt/notesSlides/notesSlide4.xml><?xml version="1.0" encoding="utf-8"?>
-<p:notes xmlns:a="http://schemas.openxmlformats.org/drawingml/2006/main" xmlns:r="http://schemas.openxmlformats.org/officeDocument/2006/relationships" xmlns:mc="http://schemas.openxmlformats.org/markup-compatibility/2006" xmlns:mv="urn:schemas-microsoft-com:mac:vml" xmlns:p="http://schemas.openxmlformats.org/presentationml/2006/main" xmlns:c="http://schemas.openxmlformats.org/drawingml/2006/chart" xmlns:dgm="http://schemas.openxmlformats.org/drawingml/2006/diagram" xmlns:o="urn:schemas-microsoft-com:office:office" xmlns:v="urn:schemas-microsoft-com:vml" xmlns:pvml="urn:schemas-microsoft-com:office:powerpoint" xmlns:com="http://schemas.openxmlformats.org/drawingml/2006/compatibility" xmlns:p14="http://schemas.microsoft.com/office/powerpoint/2010/main" showMasterSp="0" showMasterPhAnim="0">
+<p:notes xmlns:a="http://schemas.openxmlformats.org/drawingml/2006/main" xmlns:r="http://schemas.openxmlformats.org/officeDocument/2006/relationships" xmlns:p="http://schemas.openxmlformats.org/presentationml/2006/main" showMasterSp="0" showMasterPhAnim="0">
   <p:cSld>
     <p:spTree>
       <p:nvGrpSpPr>
-        <p:cNvPr id="39" name="Shape 39"/>
+        <p:cNvPr id="1" name="Shape 45"/>
         <p:cNvGrpSpPr/>
         <p:nvPr/>
       </p:nvGrpSpPr>
       <p:grpSpPr>
         <a:xfrm>
-          <a:off y="0" x="0"/>
-          <a:ext cy="0" cx="0"/>
-          <a:chOff y="0" x="0"/>
-          <a:chExt cy="0" cx="0"/>
+          <a:off x="0" y="0"/>
+          <a:ext cx="0" cy="0"/>
+          <a:chOff x="0" y="0"/>
+          <a:chExt cx="0" cy="0"/>
         </a:xfrm>
       </p:grpSpPr>
       <p:sp>
         <p:nvSpPr>
-          <p:cNvPr id="40" name="Shape 40"/>
-          <p:cNvSpPr/>
+          <p:cNvPr id="46" name="Shape 46"/>
+          <p:cNvSpPr>
+            <a:spLocks noGrp="1" noRot="1" noChangeAspect="1"/>
+          </p:cNvSpPr>
           <p:nvPr>
-            <p:ph idx="2" type="sldImg"/>
+            <p:ph type="sldImg" idx="2"/>
           </p:nvPr>
         </p:nvSpPr>
         <p:spPr>
           <a:xfrm>
-            <a:off y="762000" x="1270250"/>
-            <a:ext cy="3809999" cx="5080250"/>
+            <a:off x="1270000" y="762000"/>
+            <a:ext cx="5080000" cy="3810000"/>
           </a:xfrm>
           <a:custGeom>
+            <a:avLst/>
+            <a:gdLst/>
+            <a:ahLst/>
+            <a:cxnLst/>
+            <a:rect l="0" t="0" r="0" b="0"/>
             <a:pathLst>
-              <a:path w="120000" extrusionOk="0" h="120000">
+              <a:path w="120000" h="120000" extrusionOk="0">
                 <a:moveTo>
-                  <a:pt y="0" x="0"/>
+                  <a:pt x="0" y="0"/>
                 </a:moveTo>
                 <a:lnTo>
-                  <a:pt y="0" x="120000"/>
+                  <a:pt x="120000" y="0"/>
                 </a:lnTo>
                 <a:lnTo>
-                  <a:pt y="120000" x="120000"/>
+                  <a:pt x="120000" y="120000"/>
                 </a:lnTo>
                 <a:lnTo>
-                  <a:pt y="120000" x="0"/>
+                  <a:pt x="0" y="120000"/>
                 </a:lnTo>
                 <a:close/>
               </a:path>
@@ -750,30 +887,32 @@
             </a:solidFill>
             <a:prstDash val="solid"/>
             <a:round/>
-            <a:headEnd w="med" len="med" type="none"/>
-            <a:tailEnd w="med" len="med" type="none"/>
+            <a:headEnd type="none" w="med" len="med"/>
+            <a:tailEnd type="none" w="med" len="med"/>
           </a:ln>
         </p:spPr>
       </p:sp>
       <p:sp>
         <p:nvSpPr>
-          <p:cNvPr id="41" name="Shape 41"/>
-          <p:cNvSpPr txBox="1"/>
+          <p:cNvPr id="47" name="Shape 47"/>
+          <p:cNvSpPr txBox="1">
+            <a:spLocks noGrp="1"/>
+          </p:cNvSpPr>
           <p:nvPr>
-            <p:ph idx="1" type="body"/>
+            <p:ph type="body" idx="1"/>
           </p:nvPr>
         </p:nvSpPr>
         <p:spPr>
           <a:xfrm>
-            <a:off y="4826000" x="762000"/>
-            <a:ext cy="4572000" cx="6096000"/>
+            <a:off x="762000" y="4826000"/>
+            <a:ext cx="6096000" cy="4572000"/>
           </a:xfrm>
           <a:prstGeom prst="rect">
             <a:avLst/>
           </a:prstGeom>
         </p:spPr>
         <p:txBody>
-          <a:bodyPr bIns="91425" rIns="91425" lIns="91425" tIns="91425" anchor="t" anchorCtr="0">
+          <a:bodyPr lIns="91425" tIns="91425" rIns="91425" bIns="91425" anchor="t" anchorCtr="0">
             <a:noAutofit/>
           </a:bodyPr>
           <a:lstStyle/>
@@ -784,114 +923,6 @@
               </a:spcBef>
               <a:buNone/>
             </a:pPr>
-            <a:r>
-              <a:t/>
-            </a:r>
-            <a:endParaRPr sz="1466"/>
-          </a:p>
-        </p:txBody>
-      </p:sp>
-    </p:spTree>
-  </p:cSld>
-  <p:clrMapOvr>
-    <a:masterClrMapping/>
-  </p:clrMapOvr>
-</p:notes>
-</file>
-
-<file path=ppt/notesSlides/notesSlide5.xml><?xml version="1.0" encoding="utf-8"?>
-<p:notes xmlns:a="http://schemas.openxmlformats.org/drawingml/2006/main" xmlns:r="http://schemas.openxmlformats.org/officeDocument/2006/relationships" xmlns:mc="http://schemas.openxmlformats.org/markup-compatibility/2006" xmlns:mv="urn:schemas-microsoft-com:mac:vml" xmlns:p="http://schemas.openxmlformats.org/presentationml/2006/main" xmlns:c="http://schemas.openxmlformats.org/drawingml/2006/chart" xmlns:dgm="http://schemas.openxmlformats.org/drawingml/2006/diagram" xmlns:o="urn:schemas-microsoft-com:office:office" xmlns:v="urn:schemas-microsoft-com:vml" xmlns:pvml="urn:schemas-microsoft-com:office:powerpoint" xmlns:com="http://schemas.openxmlformats.org/drawingml/2006/compatibility" xmlns:p14="http://schemas.microsoft.com/office/powerpoint/2010/main" showMasterSp="0" showMasterPhAnim="0">
-  <p:cSld>
-    <p:spTree>
-      <p:nvGrpSpPr>
-        <p:cNvPr id="45" name="Shape 45"/>
-        <p:cNvGrpSpPr/>
-        <p:nvPr/>
-      </p:nvGrpSpPr>
-      <p:grpSpPr>
-        <a:xfrm>
-          <a:off y="0" x="0"/>
-          <a:ext cy="0" cx="0"/>
-          <a:chOff y="0" x="0"/>
-          <a:chExt cy="0" cx="0"/>
-        </a:xfrm>
-      </p:grpSpPr>
-      <p:sp>
-        <p:nvSpPr>
-          <p:cNvPr id="46" name="Shape 46"/>
-          <p:cNvSpPr/>
-          <p:nvPr>
-            <p:ph idx="2" type="sldImg"/>
-          </p:nvPr>
-        </p:nvSpPr>
-        <p:spPr>
-          <a:xfrm>
-            <a:off y="762000" x="1270250"/>
-            <a:ext cy="3809999" cx="5080250"/>
-          </a:xfrm>
-          <a:custGeom>
-            <a:pathLst>
-              <a:path w="120000" extrusionOk="0" h="120000">
-                <a:moveTo>
-                  <a:pt y="0" x="0"/>
-                </a:moveTo>
-                <a:lnTo>
-                  <a:pt y="0" x="120000"/>
-                </a:lnTo>
-                <a:lnTo>
-                  <a:pt y="120000" x="120000"/>
-                </a:lnTo>
-                <a:lnTo>
-                  <a:pt y="120000" x="0"/>
-                </a:lnTo>
-                <a:close/>
-              </a:path>
-            </a:pathLst>
-          </a:custGeom>
-          <a:noFill/>
-          <a:ln w="9525" cap="flat">
-            <a:solidFill>
-              <a:srgbClr val="000000"/>
-            </a:solidFill>
-            <a:prstDash val="solid"/>
-            <a:round/>
-            <a:headEnd w="med" len="med" type="none"/>
-            <a:tailEnd w="med" len="med" type="none"/>
-          </a:ln>
-        </p:spPr>
-      </p:sp>
-      <p:sp>
-        <p:nvSpPr>
-          <p:cNvPr id="47" name="Shape 47"/>
-          <p:cNvSpPr txBox="1"/>
-          <p:nvPr>
-            <p:ph idx="1" type="body"/>
-          </p:nvPr>
-        </p:nvSpPr>
-        <p:spPr>
-          <a:xfrm>
-            <a:off y="4826000" x="762000"/>
-            <a:ext cy="4572000" cx="6096000"/>
-          </a:xfrm>
-          <a:prstGeom prst="rect">
-            <a:avLst/>
-          </a:prstGeom>
-        </p:spPr>
-        <p:txBody>
-          <a:bodyPr bIns="91425" rIns="91425" lIns="91425" tIns="91425" anchor="t" anchorCtr="0">
-            <a:noAutofit/>
-          </a:bodyPr>
-          <a:lstStyle/>
-          <a:p>
-            <a:pPr>
-              <a:spcBef>
-                <a:spcPts val="0"/>
-              </a:spcBef>
-              <a:buNone/>
-            </a:pPr>
-            <a:r>
-              <a:t/>
-            </a:r>
             <a:endParaRPr sz="1466"/>
           </a:p>
         </p:txBody>
@@ -905,20 +936,20 @@
 </file>
 
 <file path=ppt/slideLayouts/slideLayout1.xml><?xml version="1.0" encoding="utf-8"?>
-<p:sldLayout xmlns:a="http://schemas.openxmlformats.org/drawingml/2006/main" xmlns:r="http://schemas.openxmlformats.org/officeDocument/2006/relationships" xmlns:mc="http://schemas.openxmlformats.org/markup-compatibility/2006" xmlns:mv="urn:schemas-microsoft-com:mac:vml" xmlns:p="http://schemas.openxmlformats.org/presentationml/2006/main" xmlns:c="http://schemas.openxmlformats.org/drawingml/2006/chart" xmlns:dgm="http://schemas.openxmlformats.org/drawingml/2006/diagram" xmlns:o="urn:schemas-microsoft-com:office:office" xmlns:v="urn:schemas-microsoft-com:vml" xmlns:pvml="urn:schemas-microsoft-com:office:powerpoint" xmlns:com="http://schemas.openxmlformats.org/drawingml/2006/compatibility" xmlns:p14="http://schemas.microsoft.com/office/powerpoint/2010/main" type="blank">
+<p:sldLayout xmlns:a="http://schemas.openxmlformats.org/drawingml/2006/main" xmlns:r="http://schemas.openxmlformats.org/officeDocument/2006/relationships" xmlns:p="http://schemas.openxmlformats.org/presentationml/2006/main" type="blank">
   <p:cSld name="Blank">
     <p:spTree>
       <p:nvGrpSpPr>
-        <p:cNvPr id="5" name="Shape 5"/>
+        <p:cNvPr id="1" name="Shape 5"/>
         <p:cNvGrpSpPr/>
         <p:nvPr/>
       </p:nvGrpSpPr>
       <p:grpSpPr>
         <a:xfrm>
-          <a:off y="0" x="0"/>
-          <a:ext cy="0" cx="0"/>
-          <a:chOff y="0" x="0"/>
-          <a:chExt cy="0" cx="0"/>
+          <a:off x="0" y="0"/>
+          <a:ext cx="0" cy="0"/>
+          <a:chOff x="0" y="0"/>
+          <a:chExt cx="0" cy="0"/>
         </a:xfrm>
       </p:grpSpPr>
     </p:spTree>
@@ -930,34 +961,36 @@
 </file>
 
 <file path=ppt/slideLayouts/slideLayout2.xml><?xml version="1.0" encoding="utf-8"?>
-<p:sldLayout xmlns:a="http://schemas.openxmlformats.org/drawingml/2006/main" xmlns:r="http://schemas.openxmlformats.org/officeDocument/2006/relationships" xmlns:mc="http://schemas.openxmlformats.org/markup-compatibility/2006" xmlns:mv="urn:schemas-microsoft-com:mac:vml" xmlns:p="http://schemas.openxmlformats.org/presentationml/2006/main" xmlns:c="http://schemas.openxmlformats.org/drawingml/2006/chart" xmlns:dgm="http://schemas.openxmlformats.org/drawingml/2006/diagram" xmlns:o="urn:schemas-microsoft-com:office:office" xmlns:v="urn:schemas-microsoft-com:vml" xmlns:pvml="urn:schemas-microsoft-com:office:powerpoint" xmlns:com="http://schemas.openxmlformats.org/drawingml/2006/compatibility" xmlns:p14="http://schemas.microsoft.com/office/powerpoint/2010/main" type="title">
+<p:sldLayout xmlns:a="http://schemas.openxmlformats.org/drawingml/2006/main" xmlns:r="http://schemas.openxmlformats.org/officeDocument/2006/relationships" xmlns:p="http://schemas.openxmlformats.org/presentationml/2006/main" type="title">
   <p:cSld name="Title Slide">
     <p:spTree>
       <p:nvGrpSpPr>
-        <p:cNvPr id="6" name="Shape 6"/>
+        <p:cNvPr id="1" name="Shape 6"/>
         <p:cNvGrpSpPr/>
         <p:nvPr/>
       </p:nvGrpSpPr>
       <p:grpSpPr>
         <a:xfrm>
-          <a:off y="0" x="0"/>
-          <a:ext cy="0" cx="0"/>
-          <a:chOff y="0" x="0"/>
-          <a:chExt cy="0" cx="0"/>
+          <a:off x="0" y="0"/>
+          <a:ext cx="0" cy="0"/>
+          <a:chOff x="0" y="0"/>
+          <a:chExt cx="0" cy="0"/>
         </a:xfrm>
       </p:grpSpPr>
       <p:sp>
         <p:nvSpPr>
           <p:cNvPr id="7" name="Shape 7"/>
-          <p:cNvSpPr txBox="1"/>
+          <p:cNvSpPr txBox="1">
+            <a:spLocks noGrp="1"/>
+          </p:cNvSpPr>
           <p:nvPr>
             <p:ph type="ctrTitle"/>
           </p:nvPr>
         </p:nvSpPr>
         <p:spPr>
           <a:xfrm>
-            <a:off y="3048000" x="914400"/>
-            <a:ext cy="1219199" cx="8331200"/>
+            <a:off x="914400" y="3048000"/>
+            <a:ext cx="8331200" cy="1219199"/>
           </a:xfrm>
           <a:prstGeom prst="rect">
             <a:avLst/>
@@ -968,7 +1001,7 @@
           </a:ln>
         </p:spPr>
         <p:txBody>
-          <a:bodyPr bIns="91425" rIns="91425" lIns="91425" tIns="91425" anchor="t" anchorCtr="0"/>
+          <a:bodyPr lIns="91425" tIns="91425" rIns="91425" bIns="91425" anchor="t" anchorCtr="0"/>
           <a:lstStyle>
             <a:lvl1pPr algn="ctr">
               <a:spcBef>
@@ -1034,21 +1067,25 @@
               <a:defRPr sz="4800"/>
             </a:lvl9pPr>
           </a:lstStyle>
-          <a:p/>
+          <a:p>
+            <a:endParaRPr/>
+          </a:p>
         </p:txBody>
       </p:sp>
       <p:sp>
         <p:nvSpPr>
           <p:cNvPr id="8" name="Shape 8"/>
-          <p:cNvSpPr txBox="1"/>
+          <p:cNvSpPr txBox="1">
+            <a:spLocks noGrp="1"/>
+          </p:cNvSpPr>
           <p:nvPr>
-            <p:ph idx="1" type="subTitle"/>
+            <p:ph type="subTitle" idx="1"/>
           </p:nvPr>
         </p:nvSpPr>
         <p:spPr>
           <a:xfrm>
-            <a:off y="4572000" x="1828800"/>
-            <a:ext cy="914400" cx="6502399"/>
+            <a:off x="1828800" y="4572000"/>
+            <a:ext cx="6502399" cy="914400"/>
           </a:xfrm>
           <a:prstGeom prst="rect">
             <a:avLst/>
@@ -1059,7 +1096,7 @@
           </a:ln>
         </p:spPr>
         <p:txBody>
-          <a:bodyPr bIns="91425" rIns="91425" lIns="91425" tIns="91425" anchor="t" anchorCtr="0"/>
+          <a:bodyPr lIns="91425" tIns="91425" rIns="91425" bIns="91425" anchor="t" anchorCtr="0"/>
           <a:lstStyle>
             <a:lvl1pPr algn="ctr">
               <a:spcBef>
@@ -1125,7 +1162,9 @@
               <a:defRPr sz="3200"/>
             </a:lvl9pPr>
           </a:lstStyle>
-          <a:p/>
+          <a:p>
+            <a:endParaRPr/>
+          </a:p>
         </p:txBody>
       </p:sp>
     </p:spTree>
@@ -1137,34 +1176,36 @@
 </file>
 
 <file path=ppt/slideLayouts/slideLayout3.xml><?xml version="1.0" encoding="utf-8"?>
-<p:sldLayout xmlns:a="http://schemas.openxmlformats.org/drawingml/2006/main" xmlns:r="http://schemas.openxmlformats.org/officeDocument/2006/relationships" xmlns:mc="http://schemas.openxmlformats.org/markup-compatibility/2006" xmlns:mv="urn:schemas-microsoft-com:mac:vml" xmlns:p="http://schemas.openxmlformats.org/presentationml/2006/main" xmlns:c="http://schemas.openxmlformats.org/drawingml/2006/chart" xmlns:dgm="http://schemas.openxmlformats.org/drawingml/2006/diagram" xmlns:o="urn:schemas-microsoft-com:office:office" xmlns:v="urn:schemas-microsoft-com:vml" xmlns:pvml="urn:schemas-microsoft-com:office:powerpoint" xmlns:com="http://schemas.openxmlformats.org/drawingml/2006/compatibility" xmlns:p14="http://schemas.microsoft.com/office/powerpoint/2010/main" type="tx">
+<p:sldLayout xmlns:a="http://schemas.openxmlformats.org/drawingml/2006/main" xmlns:r="http://schemas.openxmlformats.org/officeDocument/2006/relationships" xmlns:p="http://schemas.openxmlformats.org/presentationml/2006/main" type="tx">
   <p:cSld name="Title and Body">
     <p:spTree>
       <p:nvGrpSpPr>
-        <p:cNvPr id="9" name="Shape 9"/>
+        <p:cNvPr id="1" name="Shape 9"/>
         <p:cNvGrpSpPr/>
         <p:nvPr/>
       </p:nvGrpSpPr>
       <p:grpSpPr>
         <a:xfrm>
-          <a:off y="0" x="0"/>
-          <a:ext cy="0" cx="0"/>
-          <a:chOff y="0" x="0"/>
-          <a:chExt cy="0" cx="0"/>
+          <a:off x="0" y="0"/>
+          <a:ext cx="0" cy="0"/>
+          <a:chOff x="0" y="0"/>
+          <a:chExt cx="0" cy="0"/>
         </a:xfrm>
       </p:grpSpPr>
       <p:sp>
         <p:nvSpPr>
           <p:cNvPr id="10" name="Shape 10"/>
-          <p:cNvSpPr txBox="1"/>
+          <p:cNvSpPr txBox="1">
+            <a:spLocks noGrp="1"/>
+          </p:cNvSpPr>
           <p:nvPr>
             <p:ph type="title"/>
           </p:nvPr>
         </p:nvSpPr>
         <p:spPr>
           <a:xfrm>
-            <a:off y="304800" x="304800"/>
-            <a:ext cy="914400" cx="9550400"/>
+            <a:off x="304800" y="304800"/>
+            <a:ext cx="9550400" cy="914400"/>
           </a:xfrm>
           <a:prstGeom prst="rect">
             <a:avLst/>
@@ -1175,7 +1216,7 @@
           </a:ln>
         </p:spPr>
         <p:txBody>
-          <a:bodyPr bIns="91425" rIns="91425" lIns="91425" tIns="91425" anchor="t" anchorCtr="0"/>
+          <a:bodyPr lIns="91425" tIns="91425" rIns="91425" bIns="91425" anchor="t" anchorCtr="0"/>
           <a:lstStyle>
             <a:lvl1pPr>
               <a:spcBef>
@@ -1241,21 +1282,25 @@
               <a:defRPr sz="4266"/>
             </a:lvl9pPr>
           </a:lstStyle>
-          <a:p/>
+          <a:p>
+            <a:endParaRPr/>
+          </a:p>
         </p:txBody>
       </p:sp>
       <p:sp>
         <p:nvSpPr>
           <p:cNvPr id="11" name="Shape 11"/>
-          <p:cNvSpPr txBox="1"/>
+          <p:cNvSpPr txBox="1">
+            <a:spLocks noGrp="1"/>
+          </p:cNvSpPr>
           <p:nvPr>
-            <p:ph idx="1" type="body"/>
+            <p:ph type="body" idx="1"/>
           </p:nvPr>
         </p:nvSpPr>
         <p:spPr>
           <a:xfrm>
-            <a:off y="1828800" x="304800"/>
-            <a:ext cy="5486399" cx="9550400"/>
+            <a:off x="304800" y="1828800"/>
+            <a:ext cx="9550400" cy="5486399"/>
           </a:xfrm>
           <a:prstGeom prst="rect">
             <a:avLst/>
@@ -1266,7 +1311,7 @@
           </a:ln>
         </p:spPr>
         <p:txBody>
-          <a:bodyPr bIns="91425" rIns="91425" lIns="91425" tIns="91425" anchor="t" anchorCtr="0"/>
+          <a:bodyPr lIns="91425" tIns="91425" rIns="91425" bIns="91425" anchor="t" anchorCtr="0"/>
           <a:lstStyle>
             <a:lvl1pPr>
               <a:spcBef>
@@ -1332,7 +1377,9 @@
               <a:defRPr sz="2666"/>
             </a:lvl9pPr>
           </a:lstStyle>
-          <a:p/>
+          <a:p>
+            <a:endParaRPr/>
+          </a:p>
         </p:txBody>
       </p:sp>
     </p:spTree>
@@ -1344,34 +1391,36 @@
 </file>
 
 <file path=ppt/slideLayouts/slideLayout4.xml><?xml version="1.0" encoding="utf-8"?>
-<p:sldLayout xmlns:a="http://schemas.openxmlformats.org/drawingml/2006/main" xmlns:r="http://schemas.openxmlformats.org/officeDocument/2006/relationships" xmlns:mc="http://schemas.openxmlformats.org/markup-compatibility/2006" xmlns:mv="urn:schemas-microsoft-com:mac:vml" xmlns:p="http://schemas.openxmlformats.org/presentationml/2006/main" xmlns:c="http://schemas.openxmlformats.org/drawingml/2006/chart" xmlns:dgm="http://schemas.openxmlformats.org/drawingml/2006/diagram" xmlns:o="urn:schemas-microsoft-com:office:office" xmlns:v="urn:schemas-microsoft-com:vml" xmlns:pvml="urn:schemas-microsoft-com:office:powerpoint" xmlns:com="http://schemas.openxmlformats.org/drawingml/2006/compatibility" xmlns:p14="http://schemas.microsoft.com/office/powerpoint/2010/main" type="twoColTx">
+<p:sldLayout xmlns:a="http://schemas.openxmlformats.org/drawingml/2006/main" xmlns:r="http://schemas.openxmlformats.org/officeDocument/2006/relationships" xmlns:p="http://schemas.openxmlformats.org/presentationml/2006/main" type="twoColTx">
   <p:cSld name="Title and Two Columns">
     <p:spTree>
       <p:nvGrpSpPr>
-        <p:cNvPr id="12" name="Shape 12"/>
+        <p:cNvPr id="1" name="Shape 12"/>
         <p:cNvGrpSpPr/>
         <p:nvPr/>
       </p:nvGrpSpPr>
       <p:grpSpPr>
         <a:xfrm>
-          <a:off y="0" x="0"/>
-          <a:ext cy="0" cx="0"/>
-          <a:chOff y="0" x="0"/>
-          <a:chExt cy="0" cx="0"/>
+          <a:off x="0" y="0"/>
+          <a:ext cx="0" cy="0"/>
+          <a:chOff x="0" y="0"/>
+          <a:chExt cx="0" cy="0"/>
         </a:xfrm>
       </p:grpSpPr>
       <p:sp>
         <p:nvSpPr>
           <p:cNvPr id="13" name="Shape 13"/>
-          <p:cNvSpPr txBox="1"/>
+          <p:cNvSpPr txBox="1">
+            <a:spLocks noGrp="1"/>
+          </p:cNvSpPr>
           <p:nvPr>
             <p:ph type="title"/>
           </p:nvPr>
         </p:nvSpPr>
         <p:spPr>
           <a:xfrm>
-            <a:off y="304800" x="304800"/>
-            <a:ext cy="914400" cx="9550400"/>
+            <a:off x="304800" y="304800"/>
+            <a:ext cx="9550400" cy="914400"/>
           </a:xfrm>
           <a:prstGeom prst="rect">
             <a:avLst/>
@@ -1382,7 +1431,7 @@
           </a:ln>
         </p:spPr>
         <p:txBody>
-          <a:bodyPr bIns="91425" rIns="91425" lIns="91425" tIns="91425" anchor="t" anchorCtr="0"/>
+          <a:bodyPr lIns="91425" tIns="91425" rIns="91425" bIns="91425" anchor="t" anchorCtr="0"/>
           <a:lstStyle>
             <a:lvl1pPr>
               <a:spcBef>
@@ -1448,21 +1497,25 @@
               <a:defRPr sz="4266"/>
             </a:lvl9pPr>
           </a:lstStyle>
-          <a:p/>
+          <a:p>
+            <a:endParaRPr/>
+          </a:p>
         </p:txBody>
       </p:sp>
       <p:sp>
         <p:nvSpPr>
           <p:cNvPr id="14" name="Shape 14"/>
-          <p:cNvSpPr txBox="1"/>
+          <p:cNvSpPr txBox="1">
+            <a:spLocks noGrp="1"/>
+          </p:cNvSpPr>
           <p:nvPr>
-            <p:ph idx="1" type="body"/>
+            <p:ph type="body" idx="1"/>
           </p:nvPr>
         </p:nvSpPr>
         <p:spPr>
           <a:xfrm>
-            <a:off y="1828800" x="304800"/>
-            <a:ext cy="5486399" cx="4470399"/>
+            <a:off x="304800" y="1828800"/>
+            <a:ext cx="4470399" cy="5486399"/>
           </a:xfrm>
           <a:prstGeom prst="rect">
             <a:avLst/>
@@ -1473,7 +1526,7 @@
           </a:ln>
         </p:spPr>
         <p:txBody>
-          <a:bodyPr bIns="91425" rIns="91425" lIns="91425" tIns="91425" anchor="t" anchorCtr="0"/>
+          <a:bodyPr lIns="91425" tIns="91425" rIns="91425" bIns="91425" anchor="t" anchorCtr="0"/>
           <a:lstStyle>
             <a:lvl1pPr>
               <a:spcBef>
@@ -1539,21 +1592,25 @@
               <a:defRPr sz="2666"/>
             </a:lvl9pPr>
           </a:lstStyle>
-          <a:p/>
+          <a:p>
+            <a:endParaRPr/>
+          </a:p>
         </p:txBody>
       </p:sp>
       <p:sp>
         <p:nvSpPr>
           <p:cNvPr id="15" name="Shape 15"/>
-          <p:cNvSpPr txBox="1"/>
+          <p:cNvSpPr txBox="1">
+            <a:spLocks noGrp="1"/>
+          </p:cNvSpPr>
           <p:nvPr>
-            <p:ph idx="2" type="body"/>
+            <p:ph type="body" idx="2"/>
           </p:nvPr>
         </p:nvSpPr>
         <p:spPr>
           <a:xfrm>
-            <a:off y="1828800" x="5384800"/>
-            <a:ext cy="5486399" cx="4470399"/>
+            <a:off x="5384800" y="1828800"/>
+            <a:ext cx="4470399" cy="5486399"/>
           </a:xfrm>
           <a:prstGeom prst="rect">
             <a:avLst/>
@@ -1564,7 +1621,7 @@
           </a:ln>
         </p:spPr>
         <p:txBody>
-          <a:bodyPr bIns="91425" rIns="91425" lIns="91425" tIns="91425" anchor="t" anchorCtr="0"/>
+          <a:bodyPr lIns="91425" tIns="91425" rIns="91425" bIns="91425" anchor="t" anchorCtr="0"/>
           <a:lstStyle>
             <a:lvl1pPr>
               <a:spcBef>
@@ -1630,7 +1687,9 @@
               <a:defRPr sz="2666"/>
             </a:lvl9pPr>
           </a:lstStyle>
-          <a:p/>
+          <a:p>
+            <a:endParaRPr/>
+          </a:p>
         </p:txBody>
       </p:sp>
     </p:spTree>
@@ -1642,34 +1701,36 @@
 </file>
 
 <file path=ppt/slideLayouts/slideLayout5.xml><?xml version="1.0" encoding="utf-8"?>
-<p:sldLayout xmlns:a="http://schemas.openxmlformats.org/drawingml/2006/main" xmlns:r="http://schemas.openxmlformats.org/officeDocument/2006/relationships" xmlns:mc="http://schemas.openxmlformats.org/markup-compatibility/2006" xmlns:mv="urn:schemas-microsoft-com:mac:vml" xmlns:p="http://schemas.openxmlformats.org/presentationml/2006/main" xmlns:c="http://schemas.openxmlformats.org/drawingml/2006/chart" xmlns:dgm="http://schemas.openxmlformats.org/drawingml/2006/diagram" xmlns:o="urn:schemas-microsoft-com:office:office" xmlns:v="urn:schemas-microsoft-com:vml" xmlns:pvml="urn:schemas-microsoft-com:office:powerpoint" xmlns:com="http://schemas.openxmlformats.org/drawingml/2006/compatibility" xmlns:p14="http://schemas.microsoft.com/office/powerpoint/2010/main">
+<p:sldLayout xmlns:a="http://schemas.openxmlformats.org/drawingml/2006/main" xmlns:r="http://schemas.openxmlformats.org/officeDocument/2006/relationships" xmlns:p="http://schemas.openxmlformats.org/presentationml/2006/main">
   <p:cSld name="Caption">
     <p:spTree>
       <p:nvGrpSpPr>
-        <p:cNvPr id="16" name="Shape 16"/>
+        <p:cNvPr id="1" name="Shape 16"/>
         <p:cNvGrpSpPr/>
         <p:nvPr/>
       </p:nvGrpSpPr>
       <p:grpSpPr>
         <a:xfrm>
-          <a:off y="0" x="0"/>
-          <a:ext cy="0" cx="0"/>
-          <a:chOff y="0" x="0"/>
-          <a:chExt cy="0" cx="0"/>
+          <a:off x="0" y="0"/>
+          <a:ext cx="0" cy="0"/>
+          <a:chOff x="0" y="0"/>
+          <a:chExt cx="0" cy="0"/>
         </a:xfrm>
       </p:grpSpPr>
       <p:sp>
         <p:nvSpPr>
           <p:cNvPr id="17" name="Shape 17"/>
-          <p:cNvSpPr txBox="1"/>
+          <p:cNvSpPr txBox="1">
+            <a:spLocks noGrp="1"/>
+          </p:cNvSpPr>
           <p:nvPr>
-            <p:ph idx="1" type="body"/>
+            <p:ph type="body" idx="1"/>
           </p:nvPr>
         </p:nvSpPr>
         <p:spPr>
           <a:xfrm>
-            <a:off y="6705600" x="304800"/>
-            <a:ext cy="609599" cx="9550400"/>
+            <a:off x="304800" y="6705600"/>
+            <a:ext cx="9550400" cy="609599"/>
           </a:xfrm>
           <a:prstGeom prst="rect">
             <a:avLst/>
@@ -1680,7 +1741,7 @@
           </a:ln>
         </p:spPr>
         <p:txBody>
-          <a:bodyPr bIns="91425" rIns="91425" lIns="91425" tIns="91425" anchor="t" anchorCtr="0"/>
+          <a:bodyPr lIns="91425" tIns="91425" rIns="91425" bIns="91425" anchor="t" anchorCtr="0"/>
           <a:lstStyle>
             <a:lvl1pPr algn="ctr">
               <a:spcBef>
@@ -1746,7 +1807,9 @@
               <a:defRPr sz="3200"/>
             </a:lvl9pPr>
           </a:lstStyle>
-          <a:p/>
+          <a:p>
+            <a:endParaRPr/>
+          </a:p>
         </p:txBody>
       </p:sp>
     </p:spTree>
@@ -1758,32 +1821,33 @@
 </file>
 
 <file path=ppt/slideMasters/slideMaster1.xml><?xml version="1.0" encoding="utf-8"?>
-<p:sldMaster xmlns:a="http://schemas.openxmlformats.org/drawingml/2006/main" xmlns:r="http://schemas.openxmlformats.org/officeDocument/2006/relationships" xmlns:mc="http://schemas.openxmlformats.org/markup-compatibility/2006" xmlns:mv="urn:schemas-microsoft-com:mac:vml" xmlns:p="http://schemas.openxmlformats.org/presentationml/2006/main" xmlns:c="http://schemas.openxmlformats.org/drawingml/2006/chart" xmlns:dgm="http://schemas.openxmlformats.org/drawingml/2006/diagram" xmlns:o="urn:schemas-microsoft-com:office:office" xmlns:v="urn:schemas-microsoft-com:vml" xmlns:pvml="urn:schemas-microsoft-com:office:powerpoint" xmlns:com="http://schemas.openxmlformats.org/drawingml/2006/compatibility" xmlns:p14="http://schemas.microsoft.com/office/powerpoint/2010/main">
+<p:sldMaster xmlns:a="http://schemas.openxmlformats.org/drawingml/2006/main" xmlns:r="http://schemas.openxmlformats.org/officeDocument/2006/relationships" xmlns:p="http://schemas.openxmlformats.org/presentationml/2006/main">
   <p:cSld>
     <p:bg>
       <p:bgPr>
         <a:solidFill>
           <a:srgbClr val="FFFFFF"/>
         </a:solidFill>
+        <a:effectLst/>
       </p:bgPr>
     </p:bg>
     <p:spTree>
       <p:nvGrpSpPr>
-        <p:cNvPr id="4" name="Shape 4"/>
+        <p:cNvPr id="1" name="Shape 4"/>
         <p:cNvGrpSpPr/>
         <p:nvPr/>
       </p:nvGrpSpPr>
       <p:grpSpPr>
         <a:xfrm>
-          <a:off y="0" x="0"/>
-          <a:ext cy="0" cx="0"/>
-          <a:chOff y="0" x="0"/>
-          <a:chExt cy="0" cx="0"/>
+          <a:off x="0" y="0"/>
+          <a:ext cx="0" cy="0"/>
+          <a:chOff x="0" y="0"/>
+          <a:chExt cx="0" cy="0"/>
         </a:xfrm>
       </p:grpSpPr>
     </p:spTree>
   </p:cSld>
-  <p:clrMap accent2="accent2" accent3="accent3" accent4="accent4" accent5="accent5" accent6="accent6" hlink="hlink" tx2="lt2" tx1="dk1" bg2="dk2" bg1="lt1" folHlink="folHlink" accent1="accent1"/>
+  <p:clrMap bg1="lt1" tx1="dk1" bg2="dk2" tx2="lt2" accent1="accent1" accent2="accent2" accent3="accent3" accent4="accent4" accent5="accent5" accent6="accent6" hlink="hlink" folHlink="folHlink"/>
   <p:sldLayoutIdLst>
     <p:sldLayoutId id="2147483648" r:id="rId1"/>
     <p:sldLayoutId id="2147483649" r:id="rId2"/>
@@ -1793,7 +1857,7 @@
   </p:sldLayoutIdLst>
   <p:txStyles>
     <p:titleStyle>
-      <a:defPPr algn="l" rtl="0" marR="0">
+      <a:defPPr marR="0" algn="l" rtl="0">
         <a:lnSpc>
           <a:spcPct val="100000"/>
         </a:lnSpc>
@@ -1804,7 +1868,7 @@
           <a:spcPts val="0"/>
         </a:spcAft>
       </a:defPPr>
-      <a:lvl1pPr algn="l" rtl="0" marR="0">
+      <a:lvl1pPr marR="0" algn="l" rtl="0">
         <a:lnSpc>
           <a:spcPct val="100000"/>
         </a:lnSpc>
@@ -1815,7 +1879,7 @@
           <a:spcPts val="0"/>
         </a:spcAft>
         <a:buNone/>
-        <a:defRPr strike="noStrike" u="none" b="0" cap="none" baseline="0" sz="1400" i="0">
+        <a:defRPr sz="1400" b="0" i="0" u="none" strike="noStrike" cap="none" baseline="0">
           <a:solidFill>
             <a:srgbClr val="000000"/>
           </a:solidFill>
@@ -1826,7 +1890,7 @@
           <a:rtl val="0"/>
         </a:defRPr>
       </a:lvl1pPr>
-      <a:lvl2pPr algn="l" rtl="0" marR="0">
+      <a:lvl2pPr marR="0" algn="l" rtl="0">
         <a:lnSpc>
           <a:spcPct val="100000"/>
         </a:lnSpc>
@@ -1837,7 +1901,7 @@
           <a:spcPts val="0"/>
         </a:spcAft>
         <a:buNone/>
-        <a:defRPr strike="noStrike" u="none" b="0" cap="none" baseline="0" sz="1400" i="0">
+        <a:defRPr sz="1400" b="0" i="0" u="none" strike="noStrike" cap="none" baseline="0">
           <a:solidFill>
             <a:srgbClr val="000000"/>
           </a:solidFill>
@@ -1850,7 +1914,7 @@
       </a:lvl2pPr>
     </p:titleStyle>
     <p:bodyStyle>
-      <a:defPPr algn="l" rtl="0" marR="0">
+      <a:defPPr marR="0" algn="l" rtl="0">
         <a:lnSpc>
           <a:spcPct val="100000"/>
         </a:lnSpc>
@@ -1861,7 +1925,7 @@
           <a:spcPts val="0"/>
         </a:spcAft>
       </a:defPPr>
-      <a:lvl1pPr algn="l" rtl="0" marR="0">
+      <a:lvl1pPr marR="0" algn="l" rtl="0">
         <a:lnSpc>
           <a:spcPct val="100000"/>
         </a:lnSpc>
@@ -1872,7 +1936,7 @@
           <a:spcPts val="0"/>
         </a:spcAft>
         <a:buNone/>
-        <a:defRPr strike="noStrike" u="none" b="0" cap="none" baseline="0" sz="1400" i="0">
+        <a:defRPr sz="1400" b="0" i="0" u="none" strike="noStrike" cap="none" baseline="0">
           <a:solidFill>
             <a:srgbClr val="000000"/>
           </a:solidFill>
@@ -1883,7 +1947,7 @@
           <a:rtl val="0"/>
         </a:defRPr>
       </a:lvl1pPr>
-      <a:lvl2pPr algn="l" rtl="0" marR="0">
+      <a:lvl2pPr marR="0" algn="l" rtl="0">
         <a:lnSpc>
           <a:spcPct val="100000"/>
         </a:lnSpc>
@@ -1894,7 +1958,7 @@
           <a:spcPts val="0"/>
         </a:spcAft>
         <a:buNone/>
-        <a:defRPr strike="noStrike" u="none" b="0" cap="none" baseline="0" sz="1400" i="0">
+        <a:defRPr sz="1400" b="0" i="0" u="none" strike="noStrike" cap="none" baseline="0">
           <a:solidFill>
             <a:srgbClr val="000000"/>
           </a:solidFill>
@@ -1905,7 +1969,7 @@
           <a:rtl val="0"/>
         </a:defRPr>
       </a:lvl2pPr>
-      <a:lvl3pPr algn="l" rtl="0" marR="0">
+      <a:lvl3pPr marR="0" algn="l" rtl="0">
         <a:lnSpc>
           <a:spcPct val="100000"/>
         </a:lnSpc>
@@ -1916,7 +1980,7 @@
           <a:spcPts val="0"/>
         </a:spcAft>
         <a:buNone/>
-        <a:defRPr strike="noStrike" u="none" b="0" cap="none" baseline="0" sz="1400" i="0">
+        <a:defRPr sz="1400" b="0" i="0" u="none" strike="noStrike" cap="none" baseline="0">
           <a:solidFill>
             <a:srgbClr val="000000"/>
           </a:solidFill>
@@ -1927,7 +1991,7 @@
           <a:rtl val="0"/>
         </a:defRPr>
       </a:lvl3pPr>
-      <a:lvl4pPr algn="l" rtl="0" marR="0">
+      <a:lvl4pPr marR="0" algn="l" rtl="0">
         <a:lnSpc>
           <a:spcPct val="100000"/>
         </a:lnSpc>
@@ -1938,7 +2002,7 @@
           <a:spcPts val="0"/>
         </a:spcAft>
         <a:buNone/>
-        <a:defRPr strike="noStrike" u="none" b="0" cap="none" baseline="0" sz="1400" i="0">
+        <a:defRPr sz="1400" b="0" i="0" u="none" strike="noStrike" cap="none" baseline="0">
           <a:solidFill>
             <a:srgbClr val="000000"/>
           </a:solidFill>
@@ -1949,7 +2013,7 @@
           <a:rtl val="0"/>
         </a:defRPr>
       </a:lvl4pPr>
-      <a:lvl5pPr algn="l" rtl="0" marR="0">
+      <a:lvl5pPr marR="0" algn="l" rtl="0">
         <a:lnSpc>
           <a:spcPct val="100000"/>
         </a:lnSpc>
@@ -1960,7 +2024,7 @@
           <a:spcPts val="0"/>
         </a:spcAft>
         <a:buNone/>
-        <a:defRPr strike="noStrike" u="none" b="0" cap="none" baseline="0" sz="1400" i="0">
+        <a:defRPr sz="1400" b="0" i="0" u="none" strike="noStrike" cap="none" baseline="0">
           <a:solidFill>
             <a:srgbClr val="000000"/>
           </a:solidFill>
@@ -1971,7 +2035,7 @@
           <a:rtl val="0"/>
         </a:defRPr>
       </a:lvl5pPr>
-      <a:lvl6pPr algn="l" rtl="0" marR="0">
+      <a:lvl6pPr marR="0" algn="l" rtl="0">
         <a:lnSpc>
           <a:spcPct val="100000"/>
         </a:lnSpc>
@@ -1982,7 +2046,7 @@
           <a:spcPts val="0"/>
         </a:spcAft>
         <a:buNone/>
-        <a:defRPr strike="noStrike" u="none" b="0" cap="none" baseline="0" sz="1400" i="0">
+        <a:defRPr sz="1400" b="0" i="0" u="none" strike="noStrike" cap="none" baseline="0">
           <a:solidFill>
             <a:srgbClr val="000000"/>
           </a:solidFill>
@@ -1993,7 +2057,7 @@
           <a:rtl val="0"/>
         </a:defRPr>
       </a:lvl6pPr>
-      <a:lvl7pPr algn="l" rtl="0" marR="0">
+      <a:lvl7pPr marR="0" algn="l" rtl="0">
         <a:lnSpc>
           <a:spcPct val="100000"/>
         </a:lnSpc>
@@ -2004,7 +2068,7 @@
           <a:spcPts val="0"/>
         </a:spcAft>
         <a:buNone/>
-        <a:defRPr strike="noStrike" u="none" b="0" cap="none" baseline="0" sz="1400" i="0">
+        <a:defRPr sz="1400" b="0" i="0" u="none" strike="noStrike" cap="none" baseline="0">
           <a:solidFill>
             <a:srgbClr val="000000"/>
           </a:solidFill>
@@ -2015,7 +2079,7 @@
           <a:rtl val="0"/>
         </a:defRPr>
       </a:lvl7pPr>
-      <a:lvl8pPr algn="l" rtl="0" marR="0">
+      <a:lvl8pPr marR="0" algn="l" rtl="0">
         <a:lnSpc>
           <a:spcPct val="100000"/>
         </a:lnSpc>
@@ -2026,7 +2090,7 @@
           <a:spcPts val="0"/>
         </a:spcAft>
         <a:buNone/>
-        <a:defRPr strike="noStrike" u="none" b="0" cap="none" baseline="0" sz="1400" i="0">
+        <a:defRPr sz="1400" b="0" i="0" u="none" strike="noStrike" cap="none" baseline="0">
           <a:solidFill>
             <a:srgbClr val="000000"/>
           </a:solidFill>
@@ -2037,7 +2101,7 @@
           <a:rtl val="0"/>
         </a:defRPr>
       </a:lvl8pPr>
-      <a:lvl9pPr algn="l" rtl="0" marR="0">
+      <a:lvl9pPr marR="0" algn="l" rtl="0">
         <a:lnSpc>
           <a:spcPct val="100000"/>
         </a:lnSpc>
@@ -2048,7 +2112,7 @@
           <a:spcPts val="0"/>
         </a:spcAft>
         <a:buNone/>
-        <a:defRPr strike="noStrike" u="none" b="0" cap="none" baseline="0" sz="1400" i="0">
+        <a:defRPr sz="1400" b="0" i="0" u="none" strike="noStrike" cap="none" baseline="0">
           <a:solidFill>
             <a:srgbClr val="000000"/>
           </a:solidFill>
@@ -2061,7 +2125,7 @@
       </a:lvl9pPr>
     </p:bodyStyle>
     <p:otherStyle>
-      <a:defPPr algn="l" rtl="0" marR="0">
+      <a:defPPr marR="0" algn="l" rtl="0">
         <a:lnSpc>
           <a:spcPct val="100000"/>
         </a:lnSpc>
@@ -2072,7 +2136,7 @@
           <a:spcPts val="0"/>
         </a:spcAft>
       </a:defPPr>
-      <a:lvl1pPr algn="l" rtl="0" marR="0">
+      <a:lvl1pPr marR="0" algn="l" rtl="0">
         <a:lnSpc>
           <a:spcPct val="100000"/>
         </a:lnSpc>
@@ -2083,7 +2147,7 @@
           <a:spcPts val="0"/>
         </a:spcAft>
         <a:buNone/>
-        <a:defRPr strike="noStrike" u="none" b="0" cap="none" baseline="0" sz="1400" i="0">
+        <a:defRPr sz="1400" b="0" i="0" u="none" strike="noStrike" cap="none" baseline="0">
           <a:solidFill>
             <a:srgbClr val="000000"/>
           </a:solidFill>
@@ -2094,7 +2158,7 @@
           <a:rtl val="0"/>
         </a:defRPr>
       </a:lvl1pPr>
-      <a:lvl2pPr algn="l" rtl="0" marR="0">
+      <a:lvl2pPr marR="0" algn="l" rtl="0">
         <a:lnSpc>
           <a:spcPct val="100000"/>
         </a:lnSpc>
@@ -2105,7 +2169,7 @@
           <a:spcPts val="0"/>
         </a:spcAft>
         <a:buNone/>
-        <a:defRPr strike="noStrike" u="none" b="0" cap="none" baseline="0" sz="1400" i="0">
+        <a:defRPr sz="1400" b="0" i="0" u="none" strike="noStrike" cap="none" baseline="0">
           <a:solidFill>
             <a:srgbClr val="000000"/>
           </a:solidFill>
@@ -2116,7 +2180,7 @@
           <a:rtl val="0"/>
         </a:defRPr>
       </a:lvl2pPr>
-      <a:lvl3pPr algn="l" rtl="0" marR="0">
+      <a:lvl3pPr marR="0" algn="l" rtl="0">
         <a:lnSpc>
           <a:spcPct val="100000"/>
         </a:lnSpc>
@@ -2127,7 +2191,7 @@
           <a:spcPts val="0"/>
         </a:spcAft>
         <a:buNone/>
-        <a:defRPr strike="noStrike" u="none" b="0" cap="none" baseline="0" sz="1400" i="0">
+        <a:defRPr sz="1400" b="0" i="0" u="none" strike="noStrike" cap="none" baseline="0">
           <a:solidFill>
             <a:srgbClr val="000000"/>
           </a:solidFill>
@@ -2138,7 +2202,7 @@
           <a:rtl val="0"/>
         </a:defRPr>
       </a:lvl3pPr>
-      <a:lvl4pPr algn="l" rtl="0" marR="0">
+      <a:lvl4pPr marR="0" algn="l" rtl="0">
         <a:lnSpc>
           <a:spcPct val="100000"/>
         </a:lnSpc>
@@ -2149,7 +2213,7 @@
           <a:spcPts val="0"/>
         </a:spcAft>
         <a:buNone/>
-        <a:defRPr strike="noStrike" u="none" b="0" cap="none" baseline="0" sz="1400" i="0">
+        <a:defRPr sz="1400" b="0" i="0" u="none" strike="noStrike" cap="none" baseline="0">
           <a:solidFill>
             <a:srgbClr val="000000"/>
           </a:solidFill>
@@ -2160,7 +2224,7 @@
           <a:rtl val="0"/>
         </a:defRPr>
       </a:lvl4pPr>
-      <a:lvl5pPr algn="l" rtl="0" marR="0">
+      <a:lvl5pPr marR="0" algn="l" rtl="0">
         <a:lnSpc>
           <a:spcPct val="100000"/>
         </a:lnSpc>
@@ -2171,7 +2235,7 @@
           <a:spcPts val="0"/>
         </a:spcAft>
         <a:buNone/>
-        <a:defRPr strike="noStrike" u="none" b="0" cap="none" baseline="0" sz="1400" i="0">
+        <a:defRPr sz="1400" b="0" i="0" u="none" strike="noStrike" cap="none" baseline="0">
           <a:solidFill>
             <a:srgbClr val="000000"/>
           </a:solidFill>
@@ -2182,7 +2246,7 @@
           <a:rtl val="0"/>
         </a:defRPr>
       </a:lvl5pPr>
-      <a:lvl6pPr algn="l" rtl="0" marR="0">
+      <a:lvl6pPr marR="0" algn="l" rtl="0">
         <a:lnSpc>
           <a:spcPct val="100000"/>
         </a:lnSpc>
@@ -2193,7 +2257,7 @@
           <a:spcPts val="0"/>
         </a:spcAft>
         <a:buNone/>
-        <a:defRPr strike="noStrike" u="none" b="0" cap="none" baseline="0" sz="1400" i="0">
+        <a:defRPr sz="1400" b="0" i="0" u="none" strike="noStrike" cap="none" baseline="0">
           <a:solidFill>
             <a:srgbClr val="000000"/>
           </a:solidFill>
@@ -2204,7 +2268,7 @@
           <a:rtl val="0"/>
         </a:defRPr>
       </a:lvl6pPr>
-      <a:lvl7pPr algn="l" rtl="0" marR="0">
+      <a:lvl7pPr marR="0" algn="l" rtl="0">
         <a:lnSpc>
           <a:spcPct val="100000"/>
         </a:lnSpc>
@@ -2215,7 +2279,7 @@
           <a:spcPts val="0"/>
         </a:spcAft>
         <a:buNone/>
-        <a:defRPr strike="noStrike" u="none" b="0" cap="none" baseline="0" sz="1400" i="0">
+        <a:defRPr sz="1400" b="0" i="0" u="none" strike="noStrike" cap="none" baseline="0">
           <a:solidFill>
             <a:srgbClr val="000000"/>
           </a:solidFill>
@@ -2226,7 +2290,7 @@
           <a:rtl val="0"/>
         </a:defRPr>
       </a:lvl7pPr>
-      <a:lvl8pPr algn="l" rtl="0" marR="0">
+      <a:lvl8pPr marR="0" algn="l" rtl="0">
         <a:lnSpc>
           <a:spcPct val="100000"/>
         </a:lnSpc>
@@ -2237,7 +2301,7 @@
           <a:spcPts val="0"/>
         </a:spcAft>
         <a:buNone/>
-        <a:defRPr strike="noStrike" u="none" b="0" cap="none" baseline="0" sz="1400" i="0">
+        <a:defRPr sz="1400" b="0" i="0" u="none" strike="noStrike" cap="none" baseline="0">
           <a:solidFill>
             <a:srgbClr val="000000"/>
           </a:solidFill>
@@ -2248,7 +2312,7 @@
           <a:rtl val="0"/>
         </a:defRPr>
       </a:lvl8pPr>
-      <a:lvl9pPr algn="l" rtl="0" marR="0">
+      <a:lvl9pPr marR="0" algn="l" rtl="0">
         <a:lnSpc>
           <a:spcPct val="100000"/>
         </a:lnSpc>
@@ -2259,7 +2323,7 @@
           <a:spcPts val="0"/>
         </a:spcAft>
         <a:buNone/>
-        <a:defRPr strike="noStrike" u="none" b="0" cap="none" baseline="0" sz="1400" i="0">
+        <a:defRPr sz="1400" b="0" i="0" u="none" strike="noStrike" cap="none" baseline="0">
           <a:solidFill>
             <a:srgbClr val="000000"/>
           </a:solidFill>
@@ -2276,41 +2340,43 @@
 </file>
 
 <file path=ppt/slides/slide1.xml><?xml version="1.0" encoding="utf-8"?>
-<p:sld xmlns:a="http://schemas.openxmlformats.org/drawingml/2006/main" xmlns:r="http://schemas.openxmlformats.org/officeDocument/2006/relationships" xmlns:mc="http://schemas.openxmlformats.org/markup-compatibility/2006" xmlns:mv="urn:schemas-microsoft-com:mac:vml" xmlns:p="http://schemas.openxmlformats.org/presentationml/2006/main" xmlns:c="http://schemas.openxmlformats.org/drawingml/2006/chart" xmlns:dgm="http://schemas.openxmlformats.org/drawingml/2006/diagram" xmlns:o="urn:schemas-microsoft-com:office:office" xmlns:v="urn:schemas-microsoft-com:vml" xmlns:pvml="urn:schemas-microsoft-com:office:powerpoint" xmlns:com="http://schemas.openxmlformats.org/drawingml/2006/compatibility" xmlns:p14="http://schemas.microsoft.com/office/powerpoint/2010/main">
+<p:sld xmlns:a="http://schemas.openxmlformats.org/drawingml/2006/main" xmlns:r="http://schemas.openxmlformats.org/officeDocument/2006/relationships" xmlns:p="http://schemas.openxmlformats.org/presentationml/2006/main">
   <p:cSld>
     <p:spTree>
       <p:nvGrpSpPr>
-        <p:cNvPr id="18" name="Shape 18"/>
+        <p:cNvPr id="1" name="Shape 18"/>
         <p:cNvGrpSpPr/>
         <p:nvPr/>
       </p:nvGrpSpPr>
       <p:grpSpPr>
         <a:xfrm>
-          <a:off y="0" x="0"/>
-          <a:ext cy="0" cx="0"/>
-          <a:chOff y="0" x="0"/>
-          <a:chExt cy="0" cx="0"/>
+          <a:off x="0" y="0"/>
+          <a:ext cx="0" cy="0"/>
+          <a:chOff x="0" y="0"/>
+          <a:chExt cx="0" cy="0"/>
         </a:xfrm>
       </p:grpSpPr>
       <p:sp>
         <p:nvSpPr>
           <p:cNvPr id="19" name="Shape 19"/>
-          <p:cNvSpPr txBox="1"/>
+          <p:cNvSpPr txBox="1">
+            <a:spLocks noGrp="1"/>
+          </p:cNvSpPr>
           <p:nvPr>
             <p:ph type="ctrTitle"/>
           </p:nvPr>
         </p:nvSpPr>
         <p:spPr>
           <a:xfrm>
-            <a:off y="95975" x="94750"/>
-            <a:ext cy="748049" cx="3908149"/>
+            <a:off x="94750" y="95975"/>
+            <a:ext cx="3908149" cy="748049"/>
           </a:xfrm>
           <a:prstGeom prst="rect">
             <a:avLst/>
           </a:prstGeom>
         </p:spPr>
         <p:txBody>
-          <a:bodyPr bIns="38100" rIns="38100" lIns="38100" tIns="38100" anchor="t" anchorCtr="0">
+          <a:bodyPr lIns="38100" tIns="38100" rIns="38100" bIns="38100" anchor="t" anchorCtr="0">
             <a:noAutofit/>
           </a:bodyPr>
           <a:lstStyle/>
@@ -2325,7 +2391,7 @@
               <a:buNone/>
             </a:pPr>
             <a:r>
-              <a:rPr sz="4266" lang="en-US">
+              <a:rPr lang="en-US" sz="4266">
                 <a:solidFill>
                   <a:srgbClr val="000000"/>
                 </a:solidFill>
@@ -2347,8 +2413,8 @@
         </p:nvSpPr>
         <p:spPr>
           <a:xfrm>
-            <a:off y="1219200" x="406400"/>
-            <a:ext cy="5925724" cx="9304575"/>
+            <a:off x="406400" y="1219200"/>
+            <a:ext cx="9304575" cy="5925724"/>
           </a:xfrm>
           <a:prstGeom prst="rect">
             <a:avLst/>
@@ -2359,12 +2425,12 @@
           </a:ln>
         </p:spPr>
         <p:txBody>
-          <a:bodyPr bIns="38100" rIns="38100" lIns="38100" tIns="38100" anchor="t" anchorCtr="0">
+          <a:bodyPr lIns="38100" tIns="38100" rIns="38100" bIns="38100" anchor="t" anchorCtr="0">
             <a:noAutofit/>
           </a:bodyPr>
           <a:lstStyle/>
           <a:p>
-            <a:pPr rtl="0" lvl="0" marR="0" indent="-203200" marL="381000">
+            <a:pPr marL="381000" marR="0" lvl="0" indent="-203200" rtl="0">
               <a:lnSpc>
                 <a:spcPct val="100000"/>
               </a:lnSpc>
@@ -2382,7 +2448,7 @@
               <a:buChar char="●"/>
             </a:pPr>
             <a:r>
-              <a:rPr sz="2400" lang="en-US">
+              <a:rPr lang="en-US" sz="2400" dirty="0">
                 <a:solidFill>
                   <a:srgbClr val="000000"/>
                 </a:solidFill>
@@ -2395,7 +2461,7 @@
             </a:r>
           </a:p>
           <a:p>
-            <a:pPr rtl="0" lvl="0" marR="0" indent="-203200" marL="381000">
+            <a:pPr marL="381000" marR="0" lvl="0" indent="-203200" rtl="0">
               <a:lnSpc>
                 <a:spcPct val="100000"/>
               </a:lnSpc>
@@ -2413,7 +2479,7 @@
               <a:buChar char="●"/>
             </a:pPr>
             <a:r>
-              <a:rPr sz="2400" lang="en-US">
+              <a:rPr lang="en-US" sz="2400" dirty="0">
                 <a:solidFill>
                   <a:srgbClr val="000000"/>
                 </a:solidFill>
@@ -2422,10 +2488,10 @@
                 <a:cs typeface="Arial"/>
                 <a:sym typeface="Arial"/>
               </a:rPr>
-              <a:t>Google API offers its own </a:t>
+              <a:t>Google API offers </a:t>
             </a:r>
             <a:r>
-              <a:rPr sz="2400" lang="en-US">
+              <a:rPr lang="en-US" sz="2400" dirty="0" err="1" smtClean="0">
                 <a:solidFill>
                   <a:srgbClr val="000000"/>
                 </a:solidFill>
@@ -2434,10 +2500,10 @@
                 <a:cs typeface="courier new"/>
                 <a:sym typeface="courier new"/>
               </a:rPr>
-              <a:t>MapActivity</a:t>
+              <a:t>MapFragment</a:t>
             </a:r>
             <a:r>
-              <a:rPr sz="2400" lang="en-US">
+              <a:rPr lang="en-US" sz="2400" dirty="0" smtClean="0">
                 <a:solidFill>
                   <a:srgbClr val="000000"/>
                 </a:solidFill>
@@ -2446,11 +2512,20 @@
                 <a:cs typeface="Arial"/>
                 <a:sym typeface="Arial"/>
               </a:rPr>
-              <a:t> and the application has to be derived from it</a:t>
+              <a:t> to show a map within a fragment</a:t>
             </a:r>
+            <a:endParaRPr lang="en-US" sz="2400" dirty="0">
+              <a:solidFill>
+                <a:srgbClr val="000000"/>
+              </a:solidFill>
+              <a:latin typeface="Arial"/>
+              <a:ea typeface="Arial"/>
+              <a:cs typeface="Arial"/>
+              <a:sym typeface="Arial"/>
+            </a:endParaRPr>
           </a:p>
           <a:p>
-            <a:pPr rtl="0" lvl="0" marR="0" indent="-203200" marL="381000">
+            <a:pPr marL="381000" marR="0" lvl="0" indent="-203200" rtl="0">
               <a:lnSpc>
                 <a:spcPct val="100000"/>
               </a:lnSpc>
@@ -2468,7 +2543,7 @@
               <a:buChar char="●"/>
             </a:pPr>
             <a:r>
-              <a:rPr sz="2400" lang="en-US">
+              <a:rPr lang="en-US" sz="2400" dirty="0">
                 <a:solidFill>
                   <a:srgbClr val="000000"/>
                 </a:solidFill>
@@ -2481,7 +2556,7 @@
             </a:r>
           </a:p>
           <a:p>
-            <a:pPr rtl="0" lvl="1" marR="0" indent="-203200" marL="762000">
+            <a:pPr marL="762000" marR="0" lvl="1" indent="-203200" rtl="0">
               <a:lnSpc>
                 <a:spcPct val="100000"/>
               </a:lnSpc>
@@ -2499,7 +2574,7 @@
               <a:buChar char="o"/>
             </a:pPr>
             <a:r>
-              <a:rPr sz="2400" lang="en-US">
+              <a:rPr lang="en-US" sz="2400" dirty="0">
                 <a:solidFill>
                   <a:srgbClr val="000000"/>
                 </a:solidFill>
@@ -2512,7 +2587,7 @@
             </a:r>
           </a:p>
           <a:p>
-            <a:pPr rtl="0" lvl="1" marR="0" indent="-203200" marL="762000">
+            <a:pPr marL="762000" marR="0" lvl="1" indent="-203200" rtl="0">
               <a:lnSpc>
                 <a:spcPct val="100000"/>
               </a:lnSpc>
@@ -2530,7 +2605,7 @@
               <a:buChar char="o"/>
             </a:pPr>
             <a:r>
-              <a:rPr sz="2400" lang="en-US">
+              <a:rPr lang="en-US" sz="2400" dirty="0">
                 <a:solidFill>
                   <a:srgbClr val="000000"/>
                 </a:solidFill>
@@ -2543,7 +2618,7 @@
             </a:r>
           </a:p>
           <a:p>
-            <a:pPr rtl="0" lvl="1" marR="0" indent="-203200" marL="762000">
+            <a:pPr marL="762000" marR="0" lvl="1" indent="-203200" rtl="0">
               <a:lnSpc>
                 <a:spcPct val="100000"/>
               </a:lnSpc>
@@ -2561,7 +2636,7 @@
               <a:buChar char="o"/>
             </a:pPr>
             <a:r>
-              <a:rPr sz="2400" lang="en-US">
+              <a:rPr lang="en-US" sz="2400" dirty="0">
                 <a:solidFill>
                   <a:srgbClr val="000000"/>
                 </a:solidFill>
@@ -2570,22 +2645,10 @@
                 <a:cs typeface="Arial"/>
                 <a:sym typeface="Arial"/>
               </a:rPr>
-              <a:t>Include the key in </a:t>
+              <a:t>Include the key </a:t>
             </a:r>
             <a:r>
-              <a:rPr sz="2400" lang="en-US">
-                <a:solidFill>
-                  <a:srgbClr val="000000"/>
-                </a:solidFill>
-                <a:latin typeface="courier new"/>
-                <a:ea typeface="courier new"/>
-                <a:cs typeface="courier new"/>
-                <a:sym typeface="courier new"/>
-              </a:rPr>
-              <a:t>android:apiKey</a:t>
-            </a:r>
-            <a:r>
-              <a:rPr sz="2400" lang="en-US">
+              <a:rPr lang="en-US" sz="2400" dirty="0" smtClean="0">
                 <a:solidFill>
                   <a:srgbClr val="000000"/>
                 </a:solidFill>
@@ -2594,11 +2657,32 @@
                 <a:cs typeface="Arial"/>
                 <a:sym typeface="Arial"/>
               </a:rPr>
-              <a:t> attribute of the layout resource</a:t>
+              <a:t>in a meta-data section of </a:t>
             </a:r>
+            <a:r>
+              <a:rPr lang="en-US" sz="2400" dirty="0" err="1" smtClean="0">
+                <a:solidFill>
+                  <a:srgbClr val="000000"/>
+                </a:solidFill>
+                <a:latin typeface="Arial"/>
+                <a:ea typeface="Arial"/>
+                <a:cs typeface="Arial"/>
+                <a:sym typeface="Arial"/>
+              </a:rPr>
+              <a:t>AndroidManifest.xml</a:t>
+            </a:r>
+            <a:endParaRPr lang="en-US" sz="2400" dirty="0">
+              <a:solidFill>
+                <a:srgbClr val="000000"/>
+              </a:solidFill>
+              <a:latin typeface="Arial"/>
+              <a:ea typeface="Arial"/>
+              <a:cs typeface="Arial"/>
+              <a:sym typeface="Arial"/>
+            </a:endParaRPr>
           </a:p>
           <a:p>
-            <a:pPr rtl="0" lvl="0" marR="0" indent="-203200" marL="381000">
+            <a:pPr marL="381000" marR="0" lvl="0" indent="-203200" rtl="0">
               <a:lnSpc>
                 <a:spcPct val="100000"/>
               </a:lnSpc>
@@ -2616,7 +2700,7 @@
               <a:buChar char="●"/>
             </a:pPr>
             <a:r>
-              <a:rPr sz="2400" lang="en-US">
+              <a:rPr lang="en-US" sz="2400" dirty="0" err="1" smtClean="0">
                 <a:solidFill>
                   <a:srgbClr val="000000"/>
                 </a:solidFill>
@@ -2625,10 +2709,10 @@
                 <a:cs typeface="courier new"/>
                 <a:sym typeface="courier new"/>
               </a:rPr>
-              <a:t>MapView</a:t>
+              <a:t>GoogleMap</a:t>
             </a:r>
             <a:r>
-              <a:rPr sz="2400" lang="en-US">
+              <a:rPr lang="en-US" sz="2400" dirty="0">
                 <a:solidFill>
                   <a:srgbClr val="000000"/>
                 </a:solidFill>
@@ -2641,7 +2725,7 @@
             </a:r>
           </a:p>
           <a:p>
-            <a:pPr rtl="0" lvl="1" marR="0" indent="-203200" marL="762000">
+            <a:pPr marL="762000" marR="0" lvl="1" indent="-203200" rtl="0">
               <a:lnSpc>
                 <a:spcPct val="100000"/>
               </a:lnSpc>
@@ -2659,7 +2743,7 @@
               <a:buChar char="o"/>
             </a:pPr>
             <a:r>
-              <a:rPr sz="2400" lang="en-US">
+              <a:rPr lang="en-US" sz="2400" dirty="0" smtClean="0">
                 <a:solidFill>
                   <a:srgbClr val="000000"/>
                 </a:solidFill>
@@ -2668,11 +2752,23 @@
                 <a:cs typeface="Arial"/>
                 <a:sym typeface="Arial"/>
               </a:rPr>
-              <a:t>acts as a wrapper around the Google Maps API to manipulate and work with Google Maps data</a:t>
+              <a:t>Provides access to </a:t>
+            </a:r>
+            <a:r>
+              <a:rPr lang="en-US" sz="2400" dirty="0">
+                <a:solidFill>
+                  <a:srgbClr val="000000"/>
+                </a:solidFill>
+                <a:latin typeface="Arial"/>
+                <a:ea typeface="Arial"/>
+                <a:cs typeface="Arial"/>
+                <a:sym typeface="Arial"/>
+              </a:rPr>
+              <a:t>the Google Maps API to manipulate and work with Google Maps data</a:t>
             </a:r>
           </a:p>
           <a:p>
-            <a:pPr rtl="0" lvl="0" marR="0" indent="-203200" marL="381000">
+            <a:pPr marL="381000" marR="0" lvl="0" indent="-203200" rtl="0">
               <a:lnSpc>
                 <a:spcPct val="100000"/>
               </a:lnSpc>
@@ -2690,7 +2786,7 @@
               <a:buChar char="●"/>
             </a:pPr>
             <a:r>
-              <a:rPr sz="2400" lang="en-US">
+              <a:rPr lang="en-US" sz="2400" dirty="0" err="1" smtClean="0">
                 <a:solidFill>
                   <a:srgbClr val="000000"/>
                 </a:solidFill>
@@ -2699,10 +2795,10 @@
                 <a:cs typeface="courier new"/>
                 <a:sym typeface="courier new"/>
               </a:rPr>
-              <a:t>setBuiltInZoomControls()</a:t>
+              <a:t>CameraUpdate</a:t>
             </a:r>
             <a:r>
-              <a:rPr sz="2400" lang="en-US">
+              <a:rPr lang="en-US" sz="2400" dirty="0">
                 <a:solidFill>
                   <a:srgbClr val="000000"/>
                 </a:solidFill>
@@ -2715,7 +2811,7 @@
             </a:r>
           </a:p>
           <a:p>
-            <a:pPr rtl="0" lvl="1" marR="0" indent="-203200" marL="762000">
+            <a:pPr marL="762000" marR="0" lvl="1" indent="-203200" rtl="0">
               <a:lnSpc>
                 <a:spcPct val="100000"/>
               </a:lnSpc>
@@ -2733,7 +2829,7 @@
               <a:buChar char="o"/>
             </a:pPr>
             <a:r>
-              <a:rPr sz="2400" lang="en-US">
+              <a:rPr lang="en-US" sz="2400" dirty="0">
                 <a:solidFill>
                   <a:srgbClr val="000000"/>
                 </a:solidFill>
@@ -2742,8 +2838,53 @@
                 <a:cs typeface="Arial"/>
                 <a:sym typeface="Arial"/>
               </a:rPr>
-              <a:t>Used to retrieve the built in ZoomControls object from MapView</a:t>
+              <a:t>Used to </a:t>
             </a:r>
+            <a:r>
+              <a:rPr lang="en-US" sz="2400" dirty="0" smtClean="0">
+                <a:solidFill>
+                  <a:srgbClr val="000000"/>
+                </a:solidFill>
+                <a:latin typeface="Arial"/>
+                <a:ea typeface="Arial"/>
+                <a:cs typeface="Arial"/>
+                <a:sym typeface="Arial"/>
+              </a:rPr>
+              <a:t>manipulate certain aspects of a </a:t>
+            </a:r>
+            <a:r>
+              <a:rPr lang="en-US" sz="2400" dirty="0" err="1" smtClean="0">
+                <a:solidFill>
+                  <a:srgbClr val="000000"/>
+                </a:solidFill>
+                <a:latin typeface="Arial"/>
+                <a:ea typeface="Arial"/>
+                <a:cs typeface="Arial"/>
+                <a:sym typeface="Arial"/>
+              </a:rPr>
+              <a:t>GoogleMap</a:t>
+            </a:r>
+            <a:r>
+              <a:rPr lang="en-US" sz="2400" dirty="0" smtClean="0">
+                <a:solidFill>
+                  <a:srgbClr val="000000"/>
+                </a:solidFill>
+                <a:latin typeface="Arial"/>
+                <a:ea typeface="Arial"/>
+                <a:cs typeface="Arial"/>
+                <a:sym typeface="Arial"/>
+              </a:rPr>
+              <a:t> (e.g., zoom level, or center of the map in terms of longitude/latitude)</a:t>
+            </a:r>
+            <a:endParaRPr lang="en-US" sz="2400" dirty="0">
+              <a:solidFill>
+                <a:srgbClr val="000000"/>
+              </a:solidFill>
+              <a:latin typeface="Arial"/>
+              <a:ea typeface="Arial"/>
+              <a:cs typeface="Arial"/>
+              <a:sym typeface="Arial"/>
+            </a:endParaRPr>
           </a:p>
           <a:p>
             <a:pPr rtl="0">
@@ -2755,6 +2896,15 @@
               </a:spcBef>
               <a:buNone/>
             </a:pPr>
+            <a:endParaRPr lang="en-US" sz="2400" dirty="0">
+              <a:solidFill>
+                <a:srgbClr val="000000"/>
+              </a:solidFill>
+              <a:latin typeface="Arial"/>
+              <a:ea typeface="Arial"/>
+              <a:cs typeface="Arial"/>
+              <a:sym typeface="Arial"/>
+            </a:endParaRPr>
           </a:p>
         </p:txBody>
       </p:sp>
@@ -2766,8 +2916,8 @@
         </p:nvSpPr>
         <p:spPr>
           <a:xfrm>
-            <a:off y="101600" x="5689600"/>
-            <a:ext cy="325825" cx="4448250"/>
+            <a:off x="5689600" y="101600"/>
+            <a:ext cx="4448250" cy="325825"/>
           </a:xfrm>
           <a:prstGeom prst="rect">
             <a:avLst/>
@@ -2778,7 +2928,7 @@
           </a:ln>
         </p:spPr>
         <p:txBody>
-          <a:bodyPr bIns="38100" rIns="38100" lIns="38100" tIns="38100" anchor="t" anchorCtr="0">
+          <a:bodyPr lIns="38100" tIns="38100" rIns="38100" bIns="38100" anchor="t" anchorCtr="0">
             <a:noAutofit/>
           </a:bodyPr>
           <a:lstStyle/>
@@ -2793,7 +2943,7 @@
               <a:buNone/>
             </a:pPr>
             <a:r>
-              <a:rPr b="1" sz="1333" lang="en-US">
+              <a:rPr lang="en-US" sz="1333" b="1">
                 <a:solidFill>
                   <a:srgbClr val="000000"/>
                 </a:solidFill>
@@ -2812,552 +2962,27 @@
   <p:clrMapOvr>
     <a:masterClrMapping/>
   </p:clrMapOvr>
-  <p:transition spd="slow">
+  <p:transition xmlns:p14="http://schemas.microsoft.com/office/powerpoint/2010/main" spd="slow">
     <p:cut/>
   </p:transition>
 </p:sld>
 </file>
 
 <file path=ppt/slides/slide2.xml><?xml version="1.0" encoding="utf-8"?>
-<p:sld xmlns:a="http://schemas.openxmlformats.org/drawingml/2006/main" xmlns:r="http://schemas.openxmlformats.org/officeDocument/2006/relationships" xmlns:mc="http://schemas.openxmlformats.org/markup-compatibility/2006" xmlns:mv="urn:schemas-microsoft-com:mac:vml" xmlns:p="http://schemas.openxmlformats.org/presentationml/2006/main" xmlns:c="http://schemas.openxmlformats.org/drawingml/2006/chart" xmlns:dgm="http://schemas.openxmlformats.org/drawingml/2006/diagram" xmlns:o="urn:schemas-microsoft-com:office:office" xmlns:v="urn:schemas-microsoft-com:vml" xmlns:pvml="urn:schemas-microsoft-com:office:powerpoint" xmlns:com="http://schemas.openxmlformats.org/drawingml/2006/compatibility" xmlns:p14="http://schemas.microsoft.com/office/powerpoint/2010/main">
+<p:sld xmlns:a="http://schemas.openxmlformats.org/drawingml/2006/main" xmlns:r="http://schemas.openxmlformats.org/officeDocument/2006/relationships" xmlns:p="http://schemas.openxmlformats.org/presentationml/2006/main">
   <p:cSld>
     <p:spTree>
       <p:nvGrpSpPr>
-        <p:cNvPr id="25" name="Shape 25"/>
+        <p:cNvPr id="1" name="Shape 30"/>
         <p:cNvGrpSpPr/>
         <p:nvPr/>
       </p:nvGrpSpPr>
       <p:grpSpPr>
         <a:xfrm>
-          <a:off y="0" x="0"/>
-          <a:ext cy="0" cx="0"/>
-          <a:chOff y="0" x="0"/>
-          <a:chExt cy="0" cx="0"/>
-        </a:xfrm>
-      </p:grpSpPr>
-      <p:sp>
-        <p:nvSpPr>
-          <p:cNvPr id="26" name="Shape 26"/>
-          <p:cNvSpPr txBox="1"/>
-          <p:nvPr/>
-        </p:nvSpPr>
-        <p:spPr>
-          <a:xfrm>
-            <a:off y="609600" x="609600"/>
-            <a:ext cy="5578425" cx="8981300"/>
-          </a:xfrm>
-          <a:prstGeom prst="rect">
-            <a:avLst/>
-          </a:prstGeom>
-          <a:noFill/>
-          <a:ln>
-            <a:noFill/>
-          </a:ln>
-        </p:spPr>
-        <p:txBody>
-          <a:bodyPr bIns="38100" rIns="38100" lIns="38100" tIns="38100" anchor="t" anchorCtr="0">
-            <a:noAutofit/>
-          </a:bodyPr>
-          <a:lstStyle/>
-          <a:p>
-            <a:pPr rtl="0">
-              <a:lnSpc>
-                <a:spcPct val="100000"/>
-              </a:lnSpc>
-              <a:spcBef>
-                <a:spcPts val="0"/>
-              </a:spcBef>
-              <a:buNone/>
-            </a:pPr>
-            <a:r>
-              <a:t/>
-            </a:r>
-            <a:endParaRPr sz="2400">
-              <a:solidFill>
-                <a:srgbClr val="000000"/>
-              </a:solidFill>
-              <a:latin typeface="Arial"/>
-              <a:ea typeface="Arial"/>
-              <a:cs typeface="Arial"/>
-              <a:sym typeface="Arial"/>
-            </a:endParaRPr>
-          </a:p>
-          <a:p>
-            <a:pPr rtl="0" lvl="0" marR="0" indent="-203200" marL="381000">
-              <a:lnSpc>
-                <a:spcPct val="100000"/>
-              </a:lnSpc>
-              <a:spcBef>
-                <a:spcPts val="0"/>
-              </a:spcBef>
-              <a:spcAft>
-                <a:spcPts val="0"/>
-              </a:spcAft>
-              <a:buClr>
-                <a:srgbClr val="000000"/>
-              </a:buClr>
-              <a:buSzPct val="100000"/>
-              <a:buFont typeface="Arial"/>
-              <a:buChar char="●"/>
-            </a:pPr>
-            <a:r>
-              <a:rPr sz="2400" lang="en-US">
-                <a:solidFill>
-                  <a:srgbClr val="000000"/>
-                </a:solidFill>
-                <a:latin typeface="courier new"/>
-                <a:ea typeface="courier new"/>
-                <a:cs typeface="courier new"/>
-                <a:sym typeface="courier new"/>
-              </a:rPr>
-              <a:t>GeoPoint</a:t>
-            </a:r>
-            <a:r>
-              <a:rPr sz="2400" lang="en-US">
-                <a:solidFill>
-                  <a:srgbClr val="000000"/>
-                </a:solidFill>
-                <a:latin typeface="Arial"/>
-                <a:ea typeface="Arial"/>
-                <a:cs typeface="Arial"/>
-                <a:sym typeface="Arial"/>
-              </a:rPr>
-              <a:t> </a:t>
-            </a:r>
-          </a:p>
-          <a:p>
-            <a:pPr rtl="0" lvl="1" marR="0" indent="-203200" marL="762000">
-              <a:lnSpc>
-                <a:spcPct val="100000"/>
-              </a:lnSpc>
-              <a:spcBef>
-                <a:spcPts val="0"/>
-              </a:spcBef>
-              <a:spcAft>
-                <a:spcPts val="0"/>
-              </a:spcAft>
-              <a:buClr>
-                <a:srgbClr val="000000"/>
-              </a:buClr>
-              <a:buSzPct val="100000"/>
-              <a:buFont typeface="Courier New"/>
-              <a:buChar char="o"/>
-            </a:pPr>
-            <a:r>
-              <a:rPr sz="2400" lang="en-US">
-                <a:solidFill>
-                  <a:srgbClr val="000000"/>
-                </a:solidFill>
-                <a:latin typeface="Arial"/>
-                <a:ea typeface="Arial"/>
-                <a:cs typeface="Arial"/>
-                <a:sym typeface="Arial"/>
-              </a:rPr>
-              <a:t>Represents a pair of latitude and longitude</a:t>
-            </a:r>
-          </a:p>
-          <a:p>
-            <a:pPr rtl="0" lvl="0" marR="0" indent="-203200" marL="381000">
-              <a:lnSpc>
-                <a:spcPct val="100000"/>
-              </a:lnSpc>
-              <a:spcBef>
-                <a:spcPts val="0"/>
-              </a:spcBef>
-              <a:spcAft>
-                <a:spcPts val="0"/>
-              </a:spcAft>
-              <a:buClr>
-                <a:srgbClr val="000000"/>
-              </a:buClr>
-              <a:buSzPct val="100000"/>
-              <a:buFont typeface="Arial"/>
-              <a:buChar char="●"/>
-            </a:pPr>
-            <a:r>
-              <a:rPr sz="2400" lang="en-US">
-                <a:solidFill>
-                  <a:srgbClr val="000000"/>
-                </a:solidFill>
-                <a:latin typeface="courier new"/>
-                <a:ea typeface="courier new"/>
-                <a:cs typeface="courier new"/>
-                <a:sym typeface="courier new"/>
-              </a:rPr>
-              <a:t>MapController</a:t>
-            </a:r>
-            <a:r>
-              <a:rPr sz="2400" lang="en-US">
-                <a:solidFill>
-                  <a:srgbClr val="000000"/>
-                </a:solidFill>
-                <a:latin typeface="Arial"/>
-                <a:ea typeface="Arial"/>
-                <a:cs typeface="Arial"/>
-                <a:sym typeface="Arial"/>
-              </a:rPr>
-              <a:t> </a:t>
-            </a:r>
-          </a:p>
-          <a:p>
-            <a:pPr rtl="0" lvl="1" marR="0" indent="-203200" marL="762000">
-              <a:lnSpc>
-                <a:spcPct val="100000"/>
-              </a:lnSpc>
-              <a:spcBef>
-                <a:spcPts val="0"/>
-              </a:spcBef>
-              <a:spcAft>
-                <a:spcPts val="0"/>
-              </a:spcAft>
-              <a:buClr>
-                <a:srgbClr val="000000"/>
-              </a:buClr>
-              <a:buSzPct val="100000"/>
-              <a:buFont typeface="Courier New"/>
-              <a:buChar char="o"/>
-            </a:pPr>
-            <a:r>
-              <a:rPr sz="2400" lang="en-US">
-                <a:solidFill>
-                  <a:srgbClr val="000000"/>
-                </a:solidFill>
-                <a:latin typeface="Arial"/>
-                <a:ea typeface="Arial"/>
-                <a:cs typeface="Arial"/>
-                <a:sym typeface="Arial"/>
-              </a:rPr>
-              <a:t>Used to set view location and zooming </a:t>
-            </a:r>
-          </a:p>
-          <a:p>
-            <a:pPr rtl="0" lvl="0" marR="0" indent="-220133" marL="381000">
-              <a:lnSpc>
-                <a:spcPct val="100000"/>
-              </a:lnSpc>
-              <a:spcBef>
-                <a:spcPts val="0"/>
-              </a:spcBef>
-              <a:spcAft>
-                <a:spcPts val="0"/>
-              </a:spcAft>
-              <a:buClr>
-                <a:srgbClr val="000000"/>
-              </a:buClr>
-              <a:buSzPct val="98765"/>
-              <a:buFont typeface="Arial"/>
-              <a:buChar char="●"/>
-            </a:pPr>
-            <a:r>
-              <a:rPr sz="2666" lang="en-US">
-                <a:solidFill>
-                  <a:srgbClr val="000000"/>
-                </a:solidFill>
-                <a:latin typeface="Arial"/>
-                <a:ea typeface="Arial"/>
-                <a:cs typeface="Arial"/>
-                <a:sym typeface="Arial"/>
-              </a:rPr>
-              <a:t>In </a:t>
-            </a:r>
-            <a:r>
-              <a:rPr sz="2666" lang="en-US">
-                <a:solidFill>
-                  <a:srgbClr val="000000"/>
-                </a:solidFill>
-                <a:latin typeface="courier new"/>
-                <a:ea typeface="courier new"/>
-                <a:cs typeface="courier new"/>
-                <a:sym typeface="courier new"/>
-              </a:rPr>
-              <a:t>AndroidManifest.xml</a:t>
-            </a:r>
-            <a:r>
-              <a:rPr sz="2666" lang="en-US">
-                <a:solidFill>
-                  <a:srgbClr val="000000"/>
-                </a:solidFill>
-                <a:latin typeface="Arial"/>
-                <a:ea typeface="Arial"/>
-                <a:cs typeface="Arial"/>
-                <a:sym typeface="Arial"/>
-              </a:rPr>
-              <a:t> </a:t>
-            </a:r>
-          </a:p>
-          <a:p>
-            <a:pPr rtl="0" lvl="1" marR="0" indent="-220133" marL="762000">
-              <a:lnSpc>
-                <a:spcPct val="100000"/>
-              </a:lnSpc>
-              <a:spcBef>
-                <a:spcPts val="0"/>
-              </a:spcBef>
-              <a:spcAft>
-                <a:spcPts val="0"/>
-              </a:spcAft>
-              <a:buClr>
-                <a:srgbClr val="000000"/>
-              </a:buClr>
-              <a:buSzPct val="98765"/>
-              <a:buFont typeface="Courier New"/>
-              <a:buChar char="o"/>
-            </a:pPr>
-            <a:r>
-              <a:rPr sz="2666" lang="en-US">
-                <a:solidFill>
-                  <a:srgbClr val="000000"/>
-                </a:solidFill>
-                <a:latin typeface="Arial"/>
-                <a:ea typeface="Arial"/>
-                <a:cs typeface="Arial"/>
-                <a:sym typeface="Arial"/>
-              </a:rPr>
-              <a:t>Permissions have to be declared :</a:t>
-            </a:r>
-          </a:p>
-          <a:p>
-            <a:pPr rtl="0" lvl="2" marR="0" indent="-220133" marL="1143000">
-              <a:lnSpc>
-                <a:spcPct val="100000"/>
-              </a:lnSpc>
-              <a:spcBef>
-                <a:spcPts val="0"/>
-              </a:spcBef>
-              <a:spcAft>
-                <a:spcPts val="0"/>
-              </a:spcAft>
-              <a:buClr>
-                <a:srgbClr val="000000"/>
-              </a:buClr>
-              <a:buSzPct val="98765"/>
-              <a:buFont typeface="Wingdings"/>
-              <a:buChar char="§"/>
-            </a:pPr>
-            <a:r>
-              <a:rPr sz="2666" lang="en-US">
-                <a:solidFill>
-                  <a:srgbClr val="000000"/>
-                </a:solidFill>
-                <a:latin typeface="courier new"/>
-                <a:ea typeface="courier new"/>
-                <a:cs typeface="courier new"/>
-                <a:sym typeface="courier new"/>
-              </a:rPr>
-              <a:t>INTERNET</a:t>
-            </a:r>
-            <a:r>
-              <a:rPr sz="2666" lang="en-US">
-                <a:solidFill>
-                  <a:srgbClr val="000000"/>
-                </a:solidFill>
-                <a:latin typeface="Arial"/>
-                <a:ea typeface="Arial"/>
-                <a:cs typeface="Arial"/>
-                <a:sym typeface="Arial"/>
-              </a:rPr>
-              <a:t> </a:t>
-            </a:r>
-          </a:p>
-          <a:p>
-            <a:pPr rtl="0" lvl="3" marR="0" indent="-220133" marL="1524000">
-              <a:lnSpc>
-                <a:spcPct val="100000"/>
-              </a:lnSpc>
-              <a:spcBef>
-                <a:spcPts val="0"/>
-              </a:spcBef>
-              <a:spcAft>
-                <a:spcPts val="0"/>
-              </a:spcAft>
-              <a:buClr>
-                <a:srgbClr val="000000"/>
-              </a:buClr>
-              <a:buSzPct val="98765"/>
-              <a:buFont typeface="Wingdings"/>
-              <a:buChar char="§"/>
-            </a:pPr>
-            <a:r>
-              <a:rPr sz="2666" lang="en-US">
-                <a:solidFill>
-                  <a:srgbClr val="000000"/>
-                </a:solidFill>
-                <a:latin typeface="Arial"/>
-                <a:ea typeface="Arial"/>
-                <a:cs typeface="Arial"/>
-                <a:sym typeface="Arial"/>
-              </a:rPr>
-              <a:t>To access internet and retrieve Gogle Maps tiles</a:t>
-            </a:r>
-          </a:p>
-          <a:p>
-            <a:pPr rtl="0" lvl="2" marR="0" indent="-220133" marL="1143000">
-              <a:lnSpc>
-                <a:spcPct val="100000"/>
-              </a:lnSpc>
-              <a:spcBef>
-                <a:spcPts val="0"/>
-              </a:spcBef>
-              <a:spcAft>
-                <a:spcPts val="0"/>
-              </a:spcAft>
-              <a:buClr>
-                <a:srgbClr val="000000"/>
-              </a:buClr>
-              <a:buSzPct val="98765"/>
-              <a:buFont typeface="Wingdings"/>
-              <a:buChar char="§"/>
-            </a:pPr>
-            <a:r>
-              <a:rPr sz="2666" lang="en-US">
-                <a:solidFill>
-                  <a:srgbClr val="000000"/>
-                </a:solidFill>
-                <a:latin typeface="courier new"/>
-                <a:ea typeface="courier new"/>
-                <a:cs typeface="courier new"/>
-                <a:sym typeface="courier new"/>
-              </a:rPr>
-              <a:t>ACCESS_FINE_LOCATION</a:t>
-            </a:r>
-            <a:r>
-              <a:rPr sz="2666" lang="en-US">
-                <a:solidFill>
-                  <a:srgbClr val="000000"/>
-                </a:solidFill>
-                <a:latin typeface="Arial"/>
-                <a:ea typeface="Arial"/>
-                <a:cs typeface="Arial"/>
-                <a:sym typeface="Arial"/>
-              </a:rPr>
-              <a:t>  </a:t>
-            </a:r>
-          </a:p>
-          <a:p>
-            <a:pPr rtl="0" lvl="1" marR="0" indent="-220133" marL="762000">
-              <a:lnSpc>
-                <a:spcPct val="100000"/>
-              </a:lnSpc>
-              <a:spcBef>
-                <a:spcPts val="0"/>
-              </a:spcBef>
-              <a:spcAft>
-                <a:spcPts val="0"/>
-              </a:spcAft>
-              <a:buClr>
-                <a:srgbClr val="000000"/>
-              </a:buClr>
-              <a:buSzPct val="98765"/>
-              <a:buFont typeface="Courier New"/>
-              <a:buChar char="o"/>
-            </a:pPr>
-            <a:r>
-              <a:rPr sz="2666" lang="en-US">
-                <a:solidFill>
-                  <a:srgbClr val="000000"/>
-                </a:solidFill>
-                <a:latin typeface="Arial"/>
-                <a:ea typeface="Arial"/>
-                <a:cs typeface="Arial"/>
-                <a:sym typeface="Arial"/>
-              </a:rPr>
-              <a:t>Reference the Map API via </a:t>
-            </a:r>
-            <a:r>
-              <a:rPr sz="2666" lang="en-US">
-                <a:solidFill>
-                  <a:srgbClr val="000000"/>
-                </a:solidFill>
-                <a:latin typeface="courier new"/>
-                <a:ea typeface="courier new"/>
-                <a:cs typeface="courier new"/>
-                <a:sym typeface="courier new"/>
-              </a:rPr>
-              <a:t>&lt;uses-library&gt;</a:t>
-            </a:r>
-          </a:p>
-          <a:p>
-            <a:pPr rtl="0">
-              <a:lnSpc>
-                <a:spcPct val="100000"/>
-              </a:lnSpc>
-              <a:spcBef>
-                <a:spcPts val="0"/>
-              </a:spcBef>
-              <a:buNone/>
-            </a:pPr>
-            <a:r>
-              <a:rPr sz="1866" lang="en-US">
-                <a:solidFill>
-                  <a:srgbClr val="000000"/>
-                </a:solidFill>
-                <a:latin typeface="courier new"/>
-                <a:ea typeface="courier new"/>
-                <a:cs typeface="courier new"/>
-                <a:sym typeface="courier new"/>
-              </a:rPr>
-              <a:t>      &lt;uses-library android:name="com.google.android.maps"/&gt;</a:t>
-            </a:r>
-          </a:p>
-          <a:p>
-            <a:pPr rtl="0" lvl="2" marR="0" indent="-220133" marL="1143000">
-              <a:lnSpc>
-                <a:spcPct val="100000"/>
-              </a:lnSpc>
-              <a:spcBef>
-                <a:spcPts val="0"/>
-              </a:spcBef>
-              <a:spcAft>
-                <a:spcPts val="0"/>
-              </a:spcAft>
-              <a:buClr>
-                <a:srgbClr val="000000"/>
-              </a:buClr>
-              <a:buSzPct val="98765"/>
-              <a:buFont typeface="Wingdings"/>
-              <a:buChar char="§"/>
-            </a:pPr>
-            <a:r>
-              <a:rPr sz="2666" lang="en-US">
-                <a:solidFill>
-                  <a:srgbClr val="000000"/>
-                </a:solidFill>
-                <a:latin typeface="Arial"/>
-                <a:ea typeface="Arial"/>
-                <a:cs typeface="Arial"/>
-                <a:sym typeface="Arial"/>
-              </a:rPr>
-              <a:t>Because we are using Google Maps library</a:t>
-            </a:r>
-          </a:p>
-        </p:txBody>
-      </p:sp>
-    </p:spTree>
-  </p:cSld>
-  <p:clrMapOvr>
-    <a:masterClrMapping/>
-  </p:clrMapOvr>
-  <p:transition spd="slow">
-    <p:cut/>
-  </p:transition>
-</p:sld>
-</file>
-
-<file path=ppt/slides/slide3.xml><?xml version="1.0" encoding="utf-8"?>
-<p:sld xmlns:a="http://schemas.openxmlformats.org/drawingml/2006/main" xmlns:r="http://schemas.openxmlformats.org/officeDocument/2006/relationships" xmlns:mc="http://schemas.openxmlformats.org/markup-compatibility/2006" xmlns:mv="urn:schemas-microsoft-com:mac:vml" xmlns:p="http://schemas.openxmlformats.org/presentationml/2006/main" xmlns:c="http://schemas.openxmlformats.org/drawingml/2006/chart" xmlns:dgm="http://schemas.openxmlformats.org/drawingml/2006/diagram" xmlns:o="urn:schemas-microsoft-com:office:office" xmlns:v="urn:schemas-microsoft-com:vml" xmlns:pvml="urn:schemas-microsoft-com:office:powerpoint" xmlns:com="http://schemas.openxmlformats.org/drawingml/2006/compatibility" xmlns:p14="http://schemas.microsoft.com/office/powerpoint/2010/main">
-  <p:cSld>
-    <p:spTree>
-      <p:nvGrpSpPr>
-        <p:cNvPr id="30" name="Shape 30"/>
-        <p:cNvGrpSpPr/>
-        <p:nvPr/>
-      </p:nvGrpSpPr>
-      <p:grpSpPr>
-        <a:xfrm>
-          <a:off y="0" x="0"/>
-          <a:ext cy="0" cx="0"/>
-          <a:chOff y="0" x="0"/>
-          <a:chExt cy="0" cx="0"/>
+          <a:off x="0" y="0"/>
+          <a:ext cx="0" cy="0"/>
+          <a:chOff x="0" y="0"/>
+          <a:chExt cx="0" cy="0"/>
         </a:xfrm>
       </p:grpSpPr>
       <p:pic>
@@ -3376,8 +3001,8 @@
         </p:blipFill>
         <p:spPr>
           <a:xfrm>
-            <a:off y="507975" x="1016000"/>
-            <a:ext cy="6858000" cx="3538450"/>
+            <a:off x="1016000" y="507975"/>
+            <a:ext cx="3538450" cy="6858000"/>
           </a:xfrm>
           <a:prstGeom prst="rect">
             <a:avLst/>
@@ -3404,8 +3029,8 @@
         </p:blipFill>
         <p:spPr>
           <a:xfrm>
-            <a:off y="507975" x="5588000"/>
-            <a:ext cy="6858000" cx="3489150"/>
+            <a:off x="5588000" y="507975"/>
+            <a:ext cx="3489150" cy="6858000"/>
           </a:xfrm>
           <a:prstGeom prst="rect">
             <a:avLst/>
@@ -3421,27 +3046,27 @@
   <p:clrMapOvr>
     <a:masterClrMapping/>
   </p:clrMapOvr>
-  <p:transition spd="slow">
+  <p:transition xmlns:p14="http://schemas.microsoft.com/office/powerpoint/2010/main" spd="slow">
     <p:cut/>
   </p:transition>
 </p:sld>
 </file>
 
-<file path=ppt/slides/slide4.xml><?xml version="1.0" encoding="utf-8"?>
-<p:sld xmlns:a="http://schemas.openxmlformats.org/drawingml/2006/main" xmlns:r="http://schemas.openxmlformats.org/officeDocument/2006/relationships" xmlns:mc="http://schemas.openxmlformats.org/markup-compatibility/2006" xmlns:mv="urn:schemas-microsoft-com:mac:vml" xmlns:p="http://schemas.openxmlformats.org/presentationml/2006/main" xmlns:c="http://schemas.openxmlformats.org/drawingml/2006/chart" xmlns:dgm="http://schemas.openxmlformats.org/drawingml/2006/diagram" xmlns:o="urn:schemas-microsoft-com:office:office" xmlns:v="urn:schemas-microsoft-com:vml" xmlns:pvml="urn:schemas-microsoft-com:office:powerpoint" xmlns:com="http://schemas.openxmlformats.org/drawingml/2006/compatibility" xmlns:p14="http://schemas.microsoft.com/office/powerpoint/2010/main">
+<file path=ppt/slides/slide3.xml><?xml version="1.0" encoding="utf-8"?>
+<p:sld xmlns:a="http://schemas.openxmlformats.org/drawingml/2006/main" xmlns:r="http://schemas.openxmlformats.org/officeDocument/2006/relationships" xmlns:p="http://schemas.openxmlformats.org/presentationml/2006/main">
   <p:cSld>
     <p:spTree>
       <p:nvGrpSpPr>
-        <p:cNvPr id="36" name="Shape 36"/>
+        <p:cNvPr id="1" name="Shape 36"/>
         <p:cNvGrpSpPr/>
         <p:nvPr/>
       </p:nvGrpSpPr>
       <p:grpSpPr>
         <a:xfrm>
-          <a:off y="0" x="0"/>
-          <a:ext cy="0" cx="0"/>
-          <a:chOff y="0" x="0"/>
-          <a:chExt cy="0" cx="0"/>
+          <a:off x="0" y="0"/>
+          <a:ext cx="0" cy="0"/>
+          <a:chOff x="0" y="0"/>
+          <a:chExt cx="0" cy="0"/>
         </a:xfrm>
       </p:grpSpPr>
       <p:sp>
@@ -3452,8 +3077,8 @@
         </p:nvSpPr>
         <p:spPr>
           <a:xfrm>
-            <a:off y="605600" x="612100"/>
-            <a:ext cy="723624" cx="3458974"/>
+            <a:off x="612100" y="605600"/>
+            <a:ext cx="3458974" cy="723624"/>
           </a:xfrm>
           <a:prstGeom prst="rect">
             <a:avLst/>
@@ -3464,7 +3089,7 @@
           </a:ln>
         </p:spPr>
         <p:txBody>
-          <a:bodyPr bIns="38100" rIns="38100" lIns="38100" tIns="38100" anchor="t" anchorCtr="0">
+          <a:bodyPr lIns="38100" tIns="38100" rIns="38100" bIns="38100" anchor="t" anchorCtr="0">
             <a:noAutofit/>
           </a:bodyPr>
           <a:lstStyle/>
@@ -3479,7 +3104,7 @@
               <a:buNone/>
             </a:pPr>
             <a:r>
-              <a:rPr sz="4266" lang="en-US">
+              <a:rPr lang="en-US" sz="4266">
                 <a:solidFill>
                   <a:srgbClr val="000000"/>
                 </a:solidFill>
@@ -3501,8 +3126,8 @@
         </p:nvSpPr>
         <p:spPr>
           <a:xfrm>
-            <a:off y="1524000" x="711200"/>
-            <a:ext cy="2065300" cx="5156199"/>
+            <a:off x="711200" y="1523999"/>
+            <a:ext cx="5156199" cy="2139813"/>
           </a:xfrm>
           <a:prstGeom prst="rect">
             <a:avLst/>
@@ -3513,12 +3138,12 @@
           </a:ln>
         </p:spPr>
         <p:txBody>
-          <a:bodyPr bIns="38100" rIns="38100" lIns="38100" tIns="38100" anchor="t" anchorCtr="0">
+          <a:bodyPr lIns="38100" tIns="38100" rIns="38100" bIns="38100" anchor="t" anchorCtr="0">
             <a:noAutofit/>
           </a:bodyPr>
           <a:lstStyle/>
           <a:p>
-            <a:pPr rtl="0" lvl="0" marR="0" indent="-220133" marL="381000">
+            <a:pPr marL="381000" marR="0" lvl="0" indent="-220133" rtl="0">
               <a:lnSpc>
                 <a:spcPct val="100000"/>
               </a:lnSpc>
@@ -3536,7 +3161,7 @@
               <a:buChar char="●"/>
             </a:pPr>
             <a:r>
-              <a:rPr u="sng" sz="2666" lang="en-US">
+              <a:rPr lang="en-US" sz="2666" u="sng" dirty="0" smtClean="0">
                 <a:solidFill>
                   <a:srgbClr val="0000FF"/>
                 </a:solidFill>
@@ -3546,11 +3171,46 @@
                 <a:sym typeface="Arial"/>
                 <a:hlinkClick r:id="rId3"/>
               </a:rPr>
-              <a:t>Maps API key</a:t>
+              <a:t>Google Maps </a:t>
             </a:r>
+            <a:r>
+              <a:rPr lang="en-US" sz="2666" u="sng" dirty="0">
+                <a:solidFill>
+                  <a:srgbClr val="0000FF"/>
+                </a:solidFill>
+                <a:latin typeface="Arial"/>
+                <a:ea typeface="Arial"/>
+                <a:cs typeface="Arial"/>
+                <a:sym typeface="Arial"/>
+                <a:hlinkClick r:id="rId3"/>
+              </a:rPr>
+              <a:t>API </a:t>
+            </a:r>
+            <a:r>
+              <a:rPr lang="en-US" sz="2666" u="sng" dirty="0" smtClean="0">
+                <a:solidFill>
+                  <a:srgbClr val="0000FF"/>
+                </a:solidFill>
+                <a:latin typeface="Arial"/>
+                <a:ea typeface="Arial"/>
+                <a:cs typeface="Arial"/>
+                <a:sym typeface="Arial"/>
+                <a:hlinkClick r:id="rId3"/>
+              </a:rPr>
+              <a:t>overview</a:t>
+            </a:r>
+            <a:endParaRPr lang="en-US" sz="2666" u="sng" dirty="0" smtClean="0">
+              <a:solidFill>
+                <a:srgbClr val="0000FF"/>
+              </a:solidFill>
+              <a:latin typeface="Arial"/>
+              <a:ea typeface="Arial"/>
+              <a:cs typeface="Arial"/>
+              <a:sym typeface="Arial"/>
+            </a:endParaRPr>
           </a:p>
           <a:p>
-            <a:pPr rtl="0" lvl="0" marR="0" indent="-220133" marL="381000">
+            <a:pPr marL="381000" marR="0" lvl="0" indent="-220133" rtl="0">
               <a:lnSpc>
                 <a:spcPct val="100000"/>
               </a:lnSpc>
@@ -3568,21 +3228,22 @@
               <a:buChar char="●"/>
             </a:pPr>
             <a:r>
-              <a:rPr u="sng" sz="2666" lang="en-US">
+              <a:rPr lang="en-US" sz="2666" u="sng" dirty="0" smtClean="0">
                 <a:solidFill>
                   <a:srgbClr val="0000FF"/>
                 </a:solidFill>
-                <a:latin typeface="Arial"/>
-                <a:ea typeface="Arial"/>
-                <a:cs typeface="Arial"/>
-                <a:sym typeface="Arial"/>
                 <a:hlinkClick r:id="rId4"/>
               </a:rPr>
-              <a:t>GeoPoint</a:t>
+              <a:t>Google Developer console</a:t>
             </a:r>
+            <a:endParaRPr lang="en-US" sz="2666" u="sng" dirty="0" smtClean="0">
+              <a:solidFill>
+                <a:srgbClr val="0000FF"/>
+              </a:solidFill>
+            </a:endParaRPr>
           </a:p>
           <a:p>
-            <a:pPr rtl="0" lvl="0" marR="0" indent="-220133" marL="381000">
+            <a:pPr marL="381000" marR="0" lvl="0" indent="-220133" rtl="0">
               <a:lnSpc>
                 <a:spcPct val="100000"/>
               </a:lnSpc>
@@ -3600,21 +3261,22 @@
               <a:buChar char="●"/>
             </a:pPr>
             <a:r>
-              <a:rPr u="sng" sz="2666" lang="en-US">
+              <a:rPr lang="en-US" sz="2666" u="sng" dirty="0" err="1" smtClean="0">
                 <a:solidFill>
                   <a:srgbClr val="0000FF"/>
                 </a:solidFill>
-                <a:latin typeface="Arial"/>
-                <a:ea typeface="Arial"/>
-                <a:cs typeface="Arial"/>
-                <a:sym typeface="Arial"/>
                 <a:hlinkClick r:id="rId5"/>
               </a:rPr>
-              <a:t>Location and Maps</a:t>
+              <a:t>MapFragment</a:t>
             </a:r>
+            <a:endParaRPr lang="en-US" sz="2666" u="sng" dirty="0" smtClean="0">
+              <a:solidFill>
+                <a:srgbClr val="0000FF"/>
+              </a:solidFill>
+            </a:endParaRPr>
           </a:p>
           <a:p>
-            <a:pPr rtl="0" lvl="0" marR="0" indent="-220133" marL="381000">
+            <a:pPr marL="381000" marR="0" lvl="0" indent="-220133" rtl="0">
               <a:lnSpc>
                 <a:spcPct val="100000"/>
               </a:lnSpc>
@@ -3632,7 +3294,7 @@
               <a:buChar char="●"/>
             </a:pPr>
             <a:r>
-              <a:rPr u="sng" sz="2666" lang="en-US">
+              <a:rPr lang="en-US" sz="2666" u="sng" dirty="0" err="1" smtClean="0">
                 <a:solidFill>
                   <a:srgbClr val="0000FF"/>
                 </a:solidFill>
@@ -3642,11 +3304,20 @@
                 <a:sym typeface="Arial"/>
                 <a:hlinkClick r:id="rId6"/>
               </a:rPr>
-              <a:t>MapView</a:t>
+              <a:t>GoogleMap</a:t>
             </a:r>
+            <a:endParaRPr lang="en-US" sz="2666" u="sng" dirty="0" smtClean="0">
+              <a:solidFill>
+                <a:srgbClr val="0000FF"/>
+              </a:solidFill>
+              <a:latin typeface="Arial"/>
+              <a:ea typeface="Arial"/>
+              <a:cs typeface="Arial"/>
+              <a:sym typeface="Arial"/>
+            </a:endParaRPr>
           </a:p>
           <a:p>
-            <a:pPr rtl="0" lvl="0" marR="0" indent="-220133" marL="381000">
+            <a:pPr marL="381000" marR="0" lvl="0" indent="-220133" rtl="0">
               <a:lnSpc>
                 <a:spcPct val="100000"/>
               </a:lnSpc>
@@ -3664,18 +3335,23 @@
               <a:buChar char="●"/>
             </a:pPr>
             <a:r>
-              <a:rPr u="sng" sz="2666" lang="en-US">
+              <a:rPr lang="en-US" sz="2666" u="sng" dirty="0" err="1" smtClean="0">
                 <a:solidFill>
                   <a:srgbClr val="0000FF"/>
                 </a:solidFill>
-                <a:latin typeface="Arial"/>
-                <a:ea typeface="Arial"/>
-                <a:cs typeface="Arial"/>
-                <a:sym typeface="Arial"/>
                 <a:hlinkClick r:id="rId7"/>
               </a:rPr>
-              <a:t>MapController</a:t>
+              <a:t>CameraUpdate</a:t>
             </a:r>
+            <a:endParaRPr lang="en-US" sz="2666" u="sng" dirty="0">
+              <a:solidFill>
+                <a:srgbClr val="0000FF"/>
+              </a:solidFill>
+              <a:latin typeface="Arial"/>
+              <a:ea typeface="Arial"/>
+              <a:cs typeface="Arial"/>
+              <a:sym typeface="Arial"/>
+            </a:endParaRPr>
           </a:p>
         </p:txBody>
       </p:sp>
@@ -3684,41 +3360,43 @@
   <p:clrMapOvr>
     <a:masterClrMapping/>
   </p:clrMapOvr>
-  <p:transition spd="slow">
+  <p:transition xmlns:p14="http://schemas.microsoft.com/office/powerpoint/2010/main" spd="slow">
     <p:cut/>
   </p:transition>
 </p:sld>
 </file>
 
-<file path=ppt/slides/slide5.xml><?xml version="1.0" encoding="utf-8"?>
-<p:sld xmlns:a="http://schemas.openxmlformats.org/drawingml/2006/main" xmlns:r="http://schemas.openxmlformats.org/officeDocument/2006/relationships" xmlns:mc="http://schemas.openxmlformats.org/markup-compatibility/2006" xmlns:mv="urn:schemas-microsoft-com:mac:vml" xmlns:p="http://schemas.openxmlformats.org/presentationml/2006/main" xmlns:c="http://schemas.openxmlformats.org/drawingml/2006/chart" xmlns:dgm="http://schemas.openxmlformats.org/drawingml/2006/diagram" xmlns:o="urn:schemas-microsoft-com:office:office" xmlns:v="urn:schemas-microsoft-com:vml" xmlns:pvml="urn:schemas-microsoft-com:office:powerpoint" xmlns:com="http://schemas.openxmlformats.org/drawingml/2006/compatibility" xmlns:p14="http://schemas.microsoft.com/office/powerpoint/2010/main">
+<file path=ppt/slides/slide4.xml><?xml version="1.0" encoding="utf-8"?>
+<p:sld xmlns:a="http://schemas.openxmlformats.org/drawingml/2006/main" xmlns:r="http://schemas.openxmlformats.org/officeDocument/2006/relationships" xmlns:p="http://schemas.openxmlformats.org/presentationml/2006/main">
   <p:cSld>
     <p:spTree>
       <p:nvGrpSpPr>
-        <p:cNvPr id="42" name="Shape 42"/>
+        <p:cNvPr id="1" name="Shape 42"/>
         <p:cNvGrpSpPr/>
         <p:nvPr/>
       </p:nvGrpSpPr>
       <p:grpSpPr>
         <a:xfrm>
-          <a:off y="0" x="0"/>
-          <a:ext cy="0" cx="0"/>
-          <a:chOff y="0" x="0"/>
-          <a:chExt cy="0" cx="0"/>
+          <a:off x="0" y="0"/>
+          <a:ext cx="0" cy="0"/>
+          <a:chOff x="0" y="0"/>
+          <a:chExt cx="0" cy="0"/>
         </a:xfrm>
       </p:grpSpPr>
       <p:sp>
         <p:nvSpPr>
           <p:cNvPr id="43" name="Shape 43"/>
-          <p:cNvSpPr txBox="1"/>
+          <p:cNvSpPr txBox="1">
+            <a:spLocks noGrp="1"/>
+          </p:cNvSpPr>
           <p:nvPr>
             <p:ph type="title"/>
           </p:nvPr>
         </p:nvSpPr>
         <p:spPr>
           <a:xfrm>
-            <a:off y="452300" x="485225"/>
-            <a:ext cy="948624" cx="2782049"/>
+            <a:off x="485225" y="452300"/>
+            <a:ext cx="2782049" cy="948624"/>
           </a:xfrm>
           <a:prstGeom prst="rect">
             <a:avLst/>
@@ -3729,7 +3407,7 @@
           </a:ln>
         </p:spPr>
         <p:txBody>
-          <a:bodyPr bIns="38100" rIns="38100" lIns="38100" tIns="38100" anchor="t" anchorCtr="0">
+          <a:bodyPr lIns="38100" tIns="38100" rIns="38100" bIns="38100" anchor="t" anchorCtr="0">
             <a:noAutofit/>
           </a:bodyPr>
           <a:lstStyle/>
@@ -3744,7 +3422,7 @@
               <a:buNone/>
             </a:pPr>
             <a:r>
-              <a:rPr sz="4266" lang="en-US">
+              <a:rPr lang="en-US" sz="4266">
                 <a:solidFill>
                   <a:srgbClr val="000000"/>
                 </a:solidFill>
@@ -3766,8 +3444,8 @@
         </p:nvSpPr>
         <p:spPr>
           <a:xfrm>
-            <a:off y="1930400" x="609600"/>
-            <a:ext cy="2848350" cx="8998075"/>
+            <a:off x="609600" y="1930400"/>
+            <a:ext cx="8998075" cy="2848350"/>
           </a:xfrm>
           <a:prstGeom prst="rect">
             <a:avLst/>
@@ -3778,12 +3456,12 @@
           </a:ln>
         </p:spPr>
         <p:txBody>
-          <a:bodyPr bIns="38100" rIns="38100" lIns="38100" tIns="38100" anchor="t" anchorCtr="0">
+          <a:bodyPr lIns="38100" tIns="38100" rIns="38100" bIns="38100" anchor="t" anchorCtr="0">
             <a:noAutofit/>
           </a:bodyPr>
           <a:lstStyle/>
           <a:p>
-            <a:pPr rtl="0" lvl="0" marR="0" indent="-220133" marL="381000">
+            <a:pPr marL="381000" marR="0" lvl="0" indent="-220133" rtl="0">
               <a:lnSpc>
                 <a:spcPct val="100000"/>
               </a:lnSpc>
@@ -3801,7 +3479,7 @@
               <a:buChar char="●"/>
             </a:pPr>
             <a:r>
-              <a:rPr b="0" sz="2666" lang="en-US">
+              <a:rPr lang="en-US" sz="2666" b="0" dirty="0">
                 <a:solidFill>
                   <a:srgbClr val="000000"/>
                 </a:solidFill>
@@ -3810,11 +3488,35 @@
                 <a:cs typeface="Arial"/>
                 <a:sym typeface="Arial"/>
               </a:rPr>
-              <a:t>Change the hardcoded langitude/latitude coordinates so that the map shows downtown Manhattan in New York City. </a:t>
+              <a:t>Change the hardcoded </a:t>
+            </a:r>
+            <a:r>
+              <a:rPr lang="en-US" sz="2666" b="0" dirty="0" smtClean="0">
+                <a:solidFill>
+                  <a:srgbClr val="000000"/>
+                </a:solidFill>
+                <a:latin typeface="Arial"/>
+                <a:ea typeface="Arial"/>
+                <a:cs typeface="Arial"/>
+                <a:sym typeface="Arial"/>
+              </a:rPr>
+              <a:t>longitude/</a:t>
+            </a:r>
+            <a:r>
+              <a:rPr lang="en-US" sz="2666" b="0" dirty="0">
+                <a:solidFill>
+                  <a:srgbClr val="000000"/>
+                </a:solidFill>
+                <a:latin typeface="Arial"/>
+                <a:ea typeface="Arial"/>
+                <a:cs typeface="Arial"/>
+                <a:sym typeface="Arial"/>
+              </a:rPr>
+              <a:t>latitude coordinates so that the map shows downtown Manhattan in New York City. </a:t>
             </a:r>
           </a:p>
           <a:p>
-            <a:pPr rtl="0" lvl="0" marR="0" indent="-220133" marL="381000">
+            <a:pPr marL="381000" marR="0" lvl="0" indent="-220133" rtl="0">
               <a:lnSpc>
                 <a:spcPct val="100000"/>
               </a:lnSpc>
@@ -3832,7 +3534,7 @@
               <a:buChar char="●"/>
             </a:pPr>
             <a:r>
-              <a:rPr b="0" sz="2666" lang="en-US">
+              <a:rPr lang="en-US" sz="2666" b="0" dirty="0">
                 <a:solidFill>
                   <a:srgbClr val="000000"/>
                 </a:solidFill>
@@ -3841,11 +3543,39 @@
                 <a:cs typeface="Arial"/>
                 <a:sym typeface="Arial"/>
               </a:rPr>
-              <a:t>Also show a pin at those coordinates </a:t>
+              <a:t>Also show a </a:t>
+            </a:r>
+            <a:r>
+              <a:rPr lang="en-US" sz="2666" dirty="0" smtClean="0"/>
+              <a:t>marker</a:t>
+            </a:r>
+            <a:r>
+              <a:rPr lang="en-US" sz="2666" b="0" dirty="0" smtClean="0">
+                <a:solidFill>
+                  <a:srgbClr val="000000"/>
+                </a:solidFill>
+                <a:latin typeface="Arial"/>
+                <a:ea typeface="Arial"/>
+                <a:cs typeface="Arial"/>
+                <a:sym typeface="Arial"/>
+              </a:rPr>
+              <a:t> </a:t>
+            </a:r>
+            <a:r>
+              <a:rPr lang="en-US" sz="2666" b="0" dirty="0">
+                <a:solidFill>
+                  <a:srgbClr val="000000"/>
+                </a:solidFill>
+                <a:latin typeface="Arial"/>
+                <a:ea typeface="Arial"/>
+                <a:cs typeface="Arial"/>
+                <a:sym typeface="Arial"/>
+              </a:rPr>
+              <a:t>at those coordinates </a:t>
             </a:r>
           </a:p>
           <a:p>
-            <a:pPr rtl="0" lvl="1" marR="0" indent="-220133" marL="762000">
+            <a:pPr marL="762000" marR="0" lvl="1" indent="-220133" rtl="0">
               <a:lnSpc>
                 <a:spcPct val="100000"/>
               </a:lnSpc>
@@ -3863,7 +3593,7 @@
               <a:buChar char="o"/>
             </a:pPr>
             <a:r>
-              <a:rPr b="0" sz="2666" lang="en-US">
+              <a:rPr lang="en-US" sz="2666" b="0" dirty="0">
                 <a:solidFill>
                   <a:srgbClr val="000000"/>
                 </a:solidFill>
@@ -3875,7 +3605,7 @@
               <a:t>(hint: </a:t>
             </a:r>
             <a:r>
-              <a:rPr u="sng" b="0" sz="2666" lang="en-US">
+              <a:rPr lang="en-US" sz="2666" b="0" u="sng" dirty="0" smtClean="0">
                 <a:solidFill>
                   <a:srgbClr val="000099"/>
                 </a:solidFill>
@@ -3885,10 +3615,10 @@
                 <a:sym typeface="Arial"/>
                 <a:hlinkClick r:id="rId3"/>
               </a:rPr>
-              <a:t>http://developer.android.com/resources/tutorials/views/hello-mapview.html</a:t>
+              <a:t>https://developers.google.com/maps/documentation/android/marker</a:t>
             </a:r>
             <a:r>
-              <a:rPr b="0" sz="2666" lang="en-US">
+              <a:rPr lang="en-US" sz="2666" b="0" dirty="0" smtClean="0">
                 <a:solidFill>
                   <a:srgbClr val="000000"/>
                 </a:solidFill>
@@ -3899,6 +3629,15 @@
               </a:rPr>
               <a:t>) </a:t>
             </a:r>
+            <a:endParaRPr lang="en-US" sz="2666" b="0" dirty="0">
+              <a:solidFill>
+                <a:srgbClr val="000000"/>
+              </a:solidFill>
+              <a:latin typeface="Arial"/>
+              <a:ea typeface="Arial"/>
+              <a:cs typeface="Arial"/>
+              <a:sym typeface="Arial"/>
+            </a:endParaRPr>
           </a:p>
         </p:txBody>
       </p:sp>
@@ -3907,14 +3646,14 @@
   <p:clrMapOvr>
     <a:masterClrMapping/>
   </p:clrMapOvr>
-  <p:transition spd="slow">
+  <p:transition xmlns:p14="http://schemas.microsoft.com/office/powerpoint/2010/main" spd="slow">
     <p:cut/>
   </p:transition>
 </p:sld>
 </file>
 
 <file path=ppt/theme/theme1.xml><?xml version="1.0" encoding="utf-8"?>
-<a:theme xmlns:a="http://schemas.openxmlformats.org/drawingml/2006/main" xmlns:r="http://schemas.openxmlformats.org/officeDocument/2006/relationships" name="Custom Theme">
+<a:theme xmlns:a="http://schemas.openxmlformats.org/drawingml/2006/main" name="Custom Theme">
   <a:themeElements>
     <a:clrScheme name="blank">
       <a:dk1>
@@ -3959,69 +3698,69 @@
         <a:latin typeface="Arial"/>
         <a:ea typeface=""/>
         <a:cs typeface=""/>
-        <a:font typeface="ＭＳ Ｐゴシック" script="Jpan"/>
-        <a:font typeface="맑은 고딕" script="Hang"/>
-        <a:font typeface="宋体" script="Hans"/>
-        <a:font typeface="新細明體" script="Hant"/>
-        <a:font typeface="Times New Roman" script="Arab"/>
-        <a:font typeface="Times New Roman" script="Hebr"/>
-        <a:font typeface="Angsana New" script="Thai"/>
-        <a:font typeface="Nyala" script="Ethi"/>
-        <a:font typeface="Vrinda" script="Beng"/>
-        <a:font typeface="Shruti" script="Gujr"/>
-        <a:font typeface="MoolBoran" script="Khmr"/>
-        <a:font typeface="Tunga" script="Knda"/>
-        <a:font typeface="Raavi" script="Guru"/>
-        <a:font typeface="Euphemia" script="Cans"/>
-        <a:font typeface="Plantagenet Cherokee" script="Cher"/>
-        <a:font typeface="Microsoft Yi Baiti" script="Yiii"/>
-        <a:font typeface="Microsoft Himalaya" script="Tibt"/>
-        <a:font typeface="MV Boli" script="Thaa"/>
-        <a:font typeface="Mangal" script="Deva"/>
-        <a:font typeface="Gautami" script="Telu"/>
-        <a:font typeface="Latha" script="Taml"/>
-        <a:font typeface="Estrangelo Edessa" script="Syrc"/>
-        <a:font typeface="Kalinga" script="Orya"/>
-        <a:font typeface="Kartika" script="Mlym"/>
-        <a:font typeface="DokChampa" script="Laoo"/>
-        <a:font typeface="Iskoola Pota" script="Sinh"/>
-        <a:font typeface="Mongolian Baiti" script="Mong"/>
-        <a:font typeface="Times New Roman" script="Viet"/>
-        <a:font typeface="Microsoft Uighur" script="Uigh"/>
+        <a:font script="Jpan" typeface="ＭＳ Ｐゴシック"/>
+        <a:font script="Hang" typeface="맑은 고딕"/>
+        <a:font script="Hans" typeface="宋体"/>
+        <a:font script="Hant" typeface="新細明體"/>
+        <a:font script="Arab" typeface="Times New Roman"/>
+        <a:font script="Hebr" typeface="Times New Roman"/>
+        <a:font script="Thai" typeface="Angsana New"/>
+        <a:font script="Ethi" typeface="Nyala"/>
+        <a:font script="Beng" typeface="Vrinda"/>
+        <a:font script="Gujr" typeface="Shruti"/>
+        <a:font script="Khmr" typeface="MoolBoran"/>
+        <a:font script="Knda" typeface="Tunga"/>
+        <a:font script="Guru" typeface="Raavi"/>
+        <a:font script="Cans" typeface="Euphemia"/>
+        <a:font script="Cher" typeface="Plantagenet Cherokee"/>
+        <a:font script="Yiii" typeface="Microsoft Yi Baiti"/>
+        <a:font script="Tibt" typeface="Microsoft Himalaya"/>
+        <a:font script="Thaa" typeface="MV Boli"/>
+        <a:font script="Deva" typeface="Mangal"/>
+        <a:font script="Telu" typeface="Gautami"/>
+        <a:font script="Taml" typeface="Latha"/>
+        <a:font script="Syrc" typeface="Estrangelo Edessa"/>
+        <a:font script="Orya" typeface="Kalinga"/>
+        <a:font script="Mlym" typeface="Kartika"/>
+        <a:font script="Laoo" typeface="DokChampa"/>
+        <a:font script="Sinh" typeface="Iskoola Pota"/>
+        <a:font script="Mong" typeface="Mongolian Baiti"/>
+        <a:font script="Viet" typeface="Times New Roman"/>
+        <a:font script="Uigh" typeface="Microsoft Uighur"/>
       </a:majorFont>
       <a:minorFont>
         <a:latin typeface="Arial"/>
         <a:ea typeface=""/>
         <a:cs typeface=""/>
-        <a:font typeface="ＭＳ Ｐゴシック" script="Jpan"/>
-        <a:font typeface="맑은 고딕" script="Hang"/>
-        <a:font typeface="宋体" script="Hans"/>
-        <a:font typeface="新細明體" script="Hant"/>
-        <a:font typeface="Times New Roman" script="Arab"/>
-        <a:font typeface="Times New Roman" script="Hebr"/>
-        <a:font typeface="Angsana New" script="Thai"/>
-        <a:font typeface="Nyala" script="Ethi"/>
-        <a:font typeface="Vrinda" script="Beng"/>
-        <a:font typeface="Shruti" script="Gujr"/>
-        <a:font typeface="MoolBoran" script="Khmr"/>
-        <a:font typeface="Tunga" script="Knda"/>
-        <a:font typeface="Raavi" script="Guru"/>
-        <a:font typeface="Euphemia" script="Cans"/>
-        <a:font typeface="Plantagenet Cherokee" script="Cher"/>
-        <a:font typeface="Microsoft Yi Baiti" script="Yiii"/>
-        <a:font typeface="Microsoft Himalaya" script="Tibt"/>
-        <a:font typeface="MV Boli" script="Thaa"/>
-        <a:font typeface="Mangal" script="Deva"/>
-        <a:font typeface="Gautami" script="Telu"/>
-        <a:font typeface="Latha" script="Taml"/>
-        <a:font typeface="Estrangelo Edessa" script="Syrc"/>
-        <a:font typeface="Kalinga" script="Orya"/>
-        <a:font typeface="Kartika" script="Mlym"/>
-        <a:font typeface="DokChampa" script="Laoo"/>
-        <a:font typeface="Iskoola Pota" script="Sinh"/>
-        <a:font typeface="Mongolian Baiti" script="Mong"/>
-        <a:font typeface="Times New Roman" script="Viet"/>
-        <a:font typeface="Microsoft Uighur" script="Uigh"/>
+        <a:font script="Jpan" typeface="ＭＳ Ｐゴシック"/>
+        <a:font script="Hang" typeface="맑은 고딕"/>
+        <a:font script="Hans" typeface="宋体"/>
+        <a:font script="Hant" typeface="新細明體"/>
+        <a:font script="Arab" typeface="Times New Roman"/>
+        <a:font script="Hebr" typeface="Times New Roman"/>
+        <a:font script="Thai" typeface="Angsana New"/>
+        <a:font script="Ethi" typeface="Nyala"/>
+        <a:font script="Beng" typeface="Vrinda"/>
+        <a:font script="Gujr" typeface="Shruti"/>
+        <a:font script="Khmr" typeface="MoolBoran"/>
+        <a:font script="Knda" typeface="Tunga"/>
+        <a:font script="Guru" typeface="Raavi"/>
+        <a:font script="Cans" typeface="Euphemia"/>
+        <a:font script="Cher" typeface="Plantagenet Cherokee"/>
+        <a:font script="Yiii" typeface="Microsoft Yi Baiti"/>
+        <a:font script="Tibt" typeface="Microsoft Himalaya"/>
+        <a:font script="Thaa" typeface="MV Boli"/>
+        <a:font script="Deva" typeface="Mangal"/>
+        <a:font script="Telu" typeface="Gautami"/>
+        <a:font script="Taml" typeface="Latha"/>
+        <a:font script="Syrc" typeface="Estrangelo Edessa"/>
+        <a:font script="Orya" typeface="Kalinga"/>
+        <a:font script="Mlym" typeface="Kartika"/>
+        <a:font script="Laoo" typeface="DokChampa"/>
+        <a:font script="Sinh" typeface="Iskoola Pota"/>
+        <a:font script="Mong" typeface="Mongolian Baiti"/>
+        <a:font script="Viet" typeface="Times New Roman"/>
+        <a:font script="Uigh" typeface="Microsoft Uighur"/>
       </a:minorFont>
     </a:fontScheme>
     <a:fmtScheme name="Office">
@@ -4073,7 +3812,7 @@
         </a:gradFill>
       </a:fillStyleLst>
       <a:lnStyleLst>
-        <a:ln w="9525" algn="ctr" cap="flat" cmpd="sng">
+        <a:ln w="9525" cap="flat" cmpd="sng" algn="ctr">
           <a:solidFill>
             <a:schemeClr val="phClr">
               <a:shade val="95000"/>
@@ -4082,13 +3821,13 @@
           </a:solidFill>
           <a:prstDash val="solid"/>
         </a:ln>
-        <a:ln w="25400" algn="ctr" cap="flat" cmpd="sng">
+        <a:ln w="25400" cap="flat" cmpd="sng" algn="ctr">
           <a:solidFill>
             <a:schemeClr val="phClr"/>
           </a:solidFill>
           <a:prstDash val="solid"/>
         </a:ln>
-        <a:ln w="38100" algn="ctr" cap="flat" cmpd="sng">
+        <a:ln w="38100" cap="flat" cmpd="sng" algn="ctr">
           <a:solidFill>
             <a:schemeClr val="phClr"/>
           </a:solidFill>
@@ -4098,7 +3837,7 @@
       <a:effectStyleLst>
         <a:effectStyle>
           <a:effectLst>
-            <a:outerShdw rotWithShape="0" dir="5400000" blurRad="40000" dist="20000">
+            <a:outerShdw blurRad="40000" dist="20000" dir="5400000" rotWithShape="0">
               <a:srgbClr val="000000">
                 <a:alpha val="38000"/>
               </a:srgbClr>
@@ -4107,7 +3846,7 @@
         </a:effectStyle>
         <a:effectStyle>
           <a:effectLst>
-            <a:outerShdw rotWithShape="0" dir="5400000" blurRad="40000" dist="23000">
+            <a:outerShdw blurRad="40000" dist="23000" dir="5400000" rotWithShape="0">
               <a:srgbClr val="000000">
                 <a:alpha val="35000"/>
               </a:srgbClr>
@@ -4116,7 +3855,7 @@
         </a:effectStyle>
         <a:effectStyle>
           <a:effectLst>
-            <a:outerShdw rotWithShape="0" dir="5400000" blurRad="40000" dist="23000">
+            <a:outerShdw blurRad="40000" dist="23000" dir="5400000" rotWithShape="0">
               <a:srgbClr val="000000">
                 <a:alpha val="35000"/>
               </a:srgbClr>
@@ -4124,10 +3863,10 @@
           </a:effectLst>
           <a:scene3d>
             <a:camera prst="orthographicFront">
-              <a:rot rev="0" lon="0" lat="0"/>
+              <a:rot lat="0" lon="0" rev="0"/>
             </a:camera>
-            <a:lightRig dir="t" rig="threePt">
-              <a:rot rev="1200000" lon="0" lat="0"/>
+            <a:lightRig rig="threePt" dir="t">
+              <a:rot lat="0" lon="0" rev="1200000"/>
             </a:lightRig>
           </a:scene3d>
           <a:sp3d>
@@ -4162,7 +3901,7 @@
             </a:gs>
           </a:gsLst>
           <a:path path="circle">
-            <a:fillToRect t="-80000" b="180000" r="50000" l="50000"/>
+            <a:fillToRect l="50000" t="-80000" r="50000" b="180000"/>
           </a:path>
         </a:gradFill>
         <a:gradFill rotWithShape="1">
@@ -4181,54 +3920,56 @@
             </a:gs>
           </a:gsLst>
           <a:path path="circle">
-            <a:fillToRect t="50000" b="50000" r="50000" l="50000"/>
+            <a:fillToRect l="50000" t="50000" r="50000" b="50000"/>
           </a:path>
         </a:gradFill>
       </a:bgFillStyleLst>
     </a:fmtScheme>
   </a:themeElements>
+  <a:objectDefaults/>
+  <a:extraClrSchemeLst/>
 </a:theme>
 </file>
 
 <file path=ppt/theme/theme2.xml><?xml version="1.0" encoding="utf-8"?>
-<a:theme xmlns:a="http://schemas.openxmlformats.org/drawingml/2006/main" xmlns:r="http://schemas.openxmlformats.org/officeDocument/2006/relationships" name="Office Theme">
+<a:theme xmlns:a="http://schemas.openxmlformats.org/drawingml/2006/main" name="Custom Theme">
   <a:themeElements>
-    <a:clrScheme name="Office">
+    <a:clrScheme name="Default">
       <a:dk1>
-        <a:sysClr val="windowText" lastClr="000000"/>
+        <a:srgbClr val="000000"/>
       </a:dk1>
       <a:lt1>
-        <a:sysClr val="window" lastClr="FFFFFF"/>
+        <a:srgbClr val="FFFFFF"/>
       </a:lt1>
       <a:dk2>
-        <a:srgbClr val="1F497D"/>
+        <a:srgbClr val="158158"/>
       </a:dk2>
       <a:lt2>
-        <a:srgbClr val="EEECE1"/>
+        <a:srgbClr val="F3F3F3"/>
       </a:lt2>
       <a:accent1>
-        <a:srgbClr val="4F81BD"/>
+        <a:srgbClr val="058DC7"/>
       </a:accent1>
       <a:accent2>
-        <a:srgbClr val="C0504D"/>
+        <a:srgbClr val="50B432"/>
       </a:accent2>
       <a:accent3>
-        <a:srgbClr val="9BBB59"/>
+        <a:srgbClr val="ED561B"/>
       </a:accent3>
       <a:accent4>
-        <a:srgbClr val="8064A2"/>
+        <a:srgbClr val="EDEF00"/>
       </a:accent4>
       <a:accent5>
-        <a:srgbClr val="4BACC6"/>
+        <a:srgbClr val="24CBE5"/>
       </a:accent5>
       <a:accent6>
-        <a:srgbClr val="F79646"/>
+        <a:srgbClr val="64E572"/>
       </a:accent6>
       <a:hlink>
-        <a:srgbClr val="0000FF"/>
+        <a:srgbClr val="2200CC"/>
       </a:hlink>
       <a:folHlink>
-        <a:srgbClr val="800080"/>
+        <a:srgbClr val="551A8B"/>
       </a:folHlink>
     </a:clrScheme>
     <a:fontScheme name="Office">
@@ -4236,69 +3977,69 @@
         <a:latin typeface="Arial"/>
         <a:ea typeface=""/>
         <a:cs typeface=""/>
-        <a:font typeface="ＭＳ Ｐゴシック" script="Jpan"/>
-        <a:font typeface="맑은 고딕" script="Hang"/>
-        <a:font typeface="宋体" script="Hans"/>
-        <a:font typeface="新細明體" script="Hant"/>
-        <a:font typeface="Times New Roman" script="Arab"/>
-        <a:font typeface="Times New Roman" script="Hebr"/>
-        <a:font typeface="Angsana New" script="Thai"/>
-        <a:font typeface="Nyala" script="Ethi"/>
-        <a:font typeface="Vrinda" script="Beng"/>
-        <a:font typeface="Shruti" script="Gujr"/>
-        <a:font typeface="MoolBoran" script="Khmr"/>
-        <a:font typeface="Tunga" script="Knda"/>
-        <a:font typeface="Raavi" script="Guru"/>
-        <a:font typeface="Euphemia" script="Cans"/>
-        <a:font typeface="Plantagenet Cherokee" script="Cher"/>
-        <a:font typeface="Microsoft Yi Baiti" script="Yiii"/>
-        <a:font typeface="Microsoft Himalaya" script="Tibt"/>
-        <a:font typeface="MV Boli" script="Thaa"/>
-        <a:font typeface="Mangal" script="Deva"/>
-        <a:font typeface="Gautami" script="Telu"/>
-        <a:font typeface="Latha" script="Taml"/>
-        <a:font typeface="Estrangelo Edessa" script="Syrc"/>
-        <a:font typeface="Kalinga" script="Orya"/>
-        <a:font typeface="Kartika" script="Mlym"/>
-        <a:font typeface="DokChampa" script="Laoo"/>
-        <a:font typeface="Iskoola Pota" script="Sinh"/>
-        <a:font typeface="Mongolian Baiti" script="Mong"/>
-        <a:font typeface="Times New Roman" script="Viet"/>
-        <a:font typeface="Microsoft Uighur" script="Uigh"/>
+        <a:font script="Jpan" typeface="ＭＳ Ｐゴシック"/>
+        <a:font script="Hang" typeface="맑은 고딕"/>
+        <a:font script="Hans" typeface="宋体"/>
+        <a:font script="Hant" typeface="新細明體"/>
+        <a:font script="Arab" typeface="Times New Roman"/>
+        <a:font script="Hebr" typeface="Times New Roman"/>
+        <a:font script="Thai" typeface="Angsana New"/>
+        <a:font script="Ethi" typeface="Nyala"/>
+        <a:font script="Beng" typeface="Vrinda"/>
+        <a:font script="Gujr" typeface="Shruti"/>
+        <a:font script="Khmr" typeface="MoolBoran"/>
+        <a:font script="Knda" typeface="Tunga"/>
+        <a:font script="Guru" typeface="Raavi"/>
+        <a:font script="Cans" typeface="Euphemia"/>
+        <a:font script="Cher" typeface="Plantagenet Cherokee"/>
+        <a:font script="Yiii" typeface="Microsoft Yi Baiti"/>
+        <a:font script="Tibt" typeface="Microsoft Himalaya"/>
+        <a:font script="Thaa" typeface="MV Boli"/>
+        <a:font script="Deva" typeface="Mangal"/>
+        <a:font script="Telu" typeface="Gautami"/>
+        <a:font script="Taml" typeface="Latha"/>
+        <a:font script="Syrc" typeface="Estrangelo Edessa"/>
+        <a:font script="Orya" typeface="Kalinga"/>
+        <a:font script="Mlym" typeface="Kartika"/>
+        <a:font script="Laoo" typeface="DokChampa"/>
+        <a:font script="Sinh" typeface="Iskoola Pota"/>
+        <a:font script="Mong" typeface="Mongolian Baiti"/>
+        <a:font script="Viet" typeface="Times New Roman"/>
+        <a:font script="Uigh" typeface="Microsoft Uighur"/>
       </a:majorFont>
       <a:minorFont>
         <a:latin typeface="Arial"/>
         <a:ea typeface=""/>
         <a:cs typeface=""/>
-        <a:font typeface="ＭＳ Ｐゴシック" script="Jpan"/>
-        <a:font typeface="맑은 고딕" script="Hang"/>
-        <a:font typeface="宋体" script="Hans"/>
-        <a:font typeface="新細明體" script="Hant"/>
-        <a:font typeface="Times New Roman" script="Arab"/>
-        <a:font typeface="Times New Roman" script="Hebr"/>
-        <a:font typeface="Angsana New" script="Thai"/>
-        <a:font typeface="Nyala" script="Ethi"/>
-        <a:font typeface="Vrinda" script="Beng"/>
-        <a:font typeface="Shruti" script="Gujr"/>
-        <a:font typeface="MoolBoran" script="Khmr"/>
-        <a:font typeface="Tunga" script="Knda"/>
-        <a:font typeface="Raavi" script="Guru"/>
-        <a:font typeface="Euphemia" script="Cans"/>
-        <a:font typeface="Plantagenet Cherokee" script="Cher"/>
-        <a:font typeface="Microsoft Yi Baiti" script="Yiii"/>
-        <a:font typeface="Microsoft Himalaya" script="Tibt"/>
-        <a:font typeface="MV Boli" script="Thaa"/>
-        <a:font typeface="Mangal" script="Deva"/>
-        <a:font typeface="Gautami" script="Telu"/>
-        <a:font typeface="Latha" script="Taml"/>
-        <a:font typeface="Estrangelo Edessa" script="Syrc"/>
-        <a:font typeface="Kalinga" script="Orya"/>
-        <a:font typeface="Kartika" script="Mlym"/>
-        <a:font typeface="DokChampa" script="Laoo"/>
-        <a:font typeface="Iskoola Pota" script="Sinh"/>
-        <a:font typeface="Mongolian Baiti" script="Mong"/>
-        <a:font typeface="Times New Roman" script="Viet"/>
-        <a:font typeface="Microsoft Uighur" script="Uigh"/>
+        <a:font script="Jpan" typeface="ＭＳ Ｐゴシック"/>
+        <a:font script="Hang" typeface="맑은 고딕"/>
+        <a:font script="Hans" typeface="宋体"/>
+        <a:font script="Hant" typeface="新細明體"/>
+        <a:font script="Arab" typeface="Times New Roman"/>
+        <a:font script="Hebr" typeface="Times New Roman"/>
+        <a:font script="Thai" typeface="Angsana New"/>
+        <a:font script="Ethi" typeface="Nyala"/>
+        <a:font script="Beng" typeface="Vrinda"/>
+        <a:font script="Gujr" typeface="Shruti"/>
+        <a:font script="Khmr" typeface="MoolBoran"/>
+        <a:font script="Knda" typeface="Tunga"/>
+        <a:font script="Guru" typeface="Raavi"/>
+        <a:font script="Cans" typeface="Euphemia"/>
+        <a:font script="Cher" typeface="Plantagenet Cherokee"/>
+        <a:font script="Yiii" typeface="Microsoft Yi Baiti"/>
+        <a:font script="Tibt" typeface="Microsoft Himalaya"/>
+        <a:font script="Thaa" typeface="MV Boli"/>
+        <a:font script="Deva" typeface="Mangal"/>
+        <a:font script="Telu" typeface="Gautami"/>
+        <a:font script="Taml" typeface="Latha"/>
+        <a:font script="Syrc" typeface="Estrangelo Edessa"/>
+        <a:font script="Orya" typeface="Kalinga"/>
+        <a:font script="Mlym" typeface="Kartika"/>
+        <a:font script="Laoo" typeface="DokChampa"/>
+        <a:font script="Sinh" typeface="Iskoola Pota"/>
+        <a:font script="Mong" typeface="Mongolian Baiti"/>
+        <a:font script="Viet" typeface="Times New Roman"/>
+        <a:font script="Uigh" typeface="Microsoft Uighur"/>
       </a:minorFont>
     </a:fontScheme>
     <a:fmtScheme name="Office">
@@ -4350,7 +4091,7 @@
         </a:gradFill>
       </a:fillStyleLst>
       <a:lnStyleLst>
-        <a:ln w="9525" algn="ctr" cap="flat" cmpd="sng">
+        <a:ln w="9525" cap="flat" cmpd="sng" algn="ctr">
           <a:solidFill>
             <a:schemeClr val="phClr">
               <a:shade val="95000"/>
@@ -4359,13 +4100,13 @@
           </a:solidFill>
           <a:prstDash val="solid"/>
         </a:ln>
-        <a:ln w="25400" algn="ctr" cap="flat" cmpd="sng">
+        <a:ln w="25400" cap="flat" cmpd="sng" algn="ctr">
           <a:solidFill>
             <a:schemeClr val="phClr"/>
           </a:solidFill>
           <a:prstDash val="solid"/>
         </a:ln>
-        <a:ln w="38100" algn="ctr" cap="flat" cmpd="sng">
+        <a:ln w="38100" cap="flat" cmpd="sng" algn="ctr">
           <a:solidFill>
             <a:schemeClr val="phClr"/>
           </a:solidFill>
@@ -4375,7 +4116,7 @@
       <a:effectStyleLst>
         <a:effectStyle>
           <a:effectLst>
-            <a:outerShdw rotWithShape="0" dir="5400000" blurRad="40000" dist="20000">
+            <a:outerShdw blurRad="40000" dist="20000" dir="5400000" rotWithShape="0">
               <a:srgbClr val="000000">
                 <a:alpha val="38000"/>
               </a:srgbClr>
@@ -4384,7 +4125,7 @@
         </a:effectStyle>
         <a:effectStyle>
           <a:effectLst>
-            <a:outerShdw rotWithShape="0" dir="5400000" blurRad="40000" dist="23000">
+            <a:outerShdw blurRad="40000" dist="23000" dir="5400000" rotWithShape="0">
               <a:srgbClr val="000000">
                 <a:alpha val="35000"/>
               </a:srgbClr>
@@ -4393,7 +4134,7 @@
         </a:effectStyle>
         <a:effectStyle>
           <a:effectLst>
-            <a:outerShdw rotWithShape="0" dir="5400000" blurRad="40000" dist="23000">
+            <a:outerShdw blurRad="40000" dist="23000" dir="5400000" rotWithShape="0">
               <a:srgbClr val="000000">
                 <a:alpha val="35000"/>
               </a:srgbClr>
@@ -4401,10 +4142,10 @@
           </a:effectLst>
           <a:scene3d>
             <a:camera prst="orthographicFront">
-              <a:rot rev="0" lon="0" lat="0"/>
+              <a:rot lat="0" lon="0" rev="0"/>
             </a:camera>
-            <a:lightRig dir="t" rig="threePt">
-              <a:rot rev="1200000" lon="0" lat="0"/>
+            <a:lightRig rig="threePt" dir="t">
+              <a:rot lat="0" lon="0" rev="1200000"/>
             </a:lightRig>
           </a:scene3d>
           <a:sp3d>
@@ -4439,7 +4180,7 @@
             </a:gs>
           </a:gsLst>
           <a:path path="circle">
-            <a:fillToRect t="-80000" b="180000" r="50000" l="50000"/>
+            <a:fillToRect l="50000" t="-80000" r="50000" b="180000"/>
           </a:path>
         </a:gradFill>
         <a:gradFill rotWithShape="1">
@@ -4458,328 +4199,13 @@
             </a:gs>
           </a:gsLst>
           <a:path path="circle">
-            <a:fillToRect t="50000" b="50000" r="50000" l="50000"/>
+            <a:fillToRect l="50000" t="50000" r="50000" b="50000"/>
           </a:path>
         </a:gradFill>
       </a:bgFillStyleLst>
     </a:fmtScheme>
   </a:themeElements>
-  <a:objectDefaults>
-    <a:spDef>
-      <a:spPr/>
-      <a:bodyPr/>
-      <a:lstStyle/>
-      <a:style>
-        <a:lnRef idx="1">
-          <a:schemeClr val="accent1"/>
-        </a:lnRef>
-        <a:fillRef idx="3">
-          <a:schemeClr val="accent1"/>
-        </a:fillRef>
-        <a:effectRef idx="2">
-          <a:schemeClr val="accent1"/>
-        </a:effectRef>
-        <a:fontRef idx="minor">
-          <a:schemeClr val="lt1"/>
-        </a:fontRef>
-      </a:style>
-    </a:spDef>
-    <a:lnDef>
-      <a:spPr/>
-      <a:bodyPr/>
-      <a:lstStyle/>
-      <a:style>
-        <a:lnRef idx="2">
-          <a:schemeClr val="accent1"/>
-        </a:lnRef>
-        <a:fillRef idx="0">
-          <a:schemeClr val="accent1"/>
-        </a:fillRef>
-        <a:effectRef idx="1">
-          <a:schemeClr val="accent1"/>
-        </a:effectRef>
-        <a:fontRef idx="minor">
-          <a:schemeClr val="tx1"/>
-        </a:fontRef>
-      </a:style>
-    </a:lnDef>
-  </a:objectDefaults>
-</a:theme>
-</file>
-
-<file path=ppt/theme/theme3.xml><?xml version="1.0" encoding="utf-8"?>
-<a:theme xmlns:a="http://schemas.openxmlformats.org/drawingml/2006/main" xmlns:r="http://schemas.openxmlformats.org/officeDocument/2006/relationships" name="Custom Theme">
-  <a:themeElements>
-    <a:clrScheme name="Default">
-      <a:dk1>
-        <a:srgbClr val="000000"/>
-      </a:dk1>
-      <a:lt1>
-        <a:srgbClr val="FFFFFF"/>
-      </a:lt1>
-      <a:dk2>
-        <a:srgbClr val="158158"/>
-      </a:dk2>
-      <a:lt2>
-        <a:srgbClr val="F3F3F3"/>
-      </a:lt2>
-      <a:accent1>
-        <a:srgbClr val="058DC7"/>
-      </a:accent1>
-      <a:accent2>
-        <a:srgbClr val="50B432"/>
-      </a:accent2>
-      <a:accent3>
-        <a:srgbClr val="ED561B"/>
-      </a:accent3>
-      <a:accent4>
-        <a:srgbClr val="EDEF00"/>
-      </a:accent4>
-      <a:accent5>
-        <a:srgbClr val="24CBE5"/>
-      </a:accent5>
-      <a:accent6>
-        <a:srgbClr val="64E572"/>
-      </a:accent6>
-      <a:hlink>
-        <a:srgbClr val="2200CC"/>
-      </a:hlink>
-      <a:folHlink>
-        <a:srgbClr val="551A8B"/>
-      </a:folHlink>
-    </a:clrScheme>
-    <a:fontScheme name="Office">
-      <a:majorFont>
-        <a:latin typeface="Arial"/>
-        <a:ea typeface=""/>
-        <a:cs typeface=""/>
-        <a:font typeface="ＭＳ Ｐゴシック" script="Jpan"/>
-        <a:font typeface="맑은 고딕" script="Hang"/>
-        <a:font typeface="宋体" script="Hans"/>
-        <a:font typeface="新細明體" script="Hant"/>
-        <a:font typeface="Times New Roman" script="Arab"/>
-        <a:font typeface="Times New Roman" script="Hebr"/>
-        <a:font typeface="Angsana New" script="Thai"/>
-        <a:font typeface="Nyala" script="Ethi"/>
-        <a:font typeface="Vrinda" script="Beng"/>
-        <a:font typeface="Shruti" script="Gujr"/>
-        <a:font typeface="MoolBoran" script="Khmr"/>
-        <a:font typeface="Tunga" script="Knda"/>
-        <a:font typeface="Raavi" script="Guru"/>
-        <a:font typeface="Euphemia" script="Cans"/>
-        <a:font typeface="Plantagenet Cherokee" script="Cher"/>
-        <a:font typeface="Microsoft Yi Baiti" script="Yiii"/>
-        <a:font typeface="Microsoft Himalaya" script="Tibt"/>
-        <a:font typeface="MV Boli" script="Thaa"/>
-        <a:font typeface="Mangal" script="Deva"/>
-        <a:font typeface="Gautami" script="Telu"/>
-        <a:font typeface="Latha" script="Taml"/>
-        <a:font typeface="Estrangelo Edessa" script="Syrc"/>
-        <a:font typeface="Kalinga" script="Orya"/>
-        <a:font typeface="Kartika" script="Mlym"/>
-        <a:font typeface="DokChampa" script="Laoo"/>
-        <a:font typeface="Iskoola Pota" script="Sinh"/>
-        <a:font typeface="Mongolian Baiti" script="Mong"/>
-        <a:font typeface="Times New Roman" script="Viet"/>
-        <a:font typeface="Microsoft Uighur" script="Uigh"/>
-      </a:majorFont>
-      <a:minorFont>
-        <a:latin typeface="Arial"/>
-        <a:ea typeface=""/>
-        <a:cs typeface=""/>
-        <a:font typeface="ＭＳ Ｐゴシック" script="Jpan"/>
-        <a:font typeface="맑은 고딕" script="Hang"/>
-        <a:font typeface="宋体" script="Hans"/>
-        <a:font typeface="新細明體" script="Hant"/>
-        <a:font typeface="Times New Roman" script="Arab"/>
-        <a:font typeface="Times New Roman" script="Hebr"/>
-        <a:font typeface="Angsana New" script="Thai"/>
-        <a:font typeface="Nyala" script="Ethi"/>
-        <a:font typeface="Vrinda" script="Beng"/>
-        <a:font typeface="Shruti" script="Gujr"/>
-        <a:font typeface="MoolBoran" script="Khmr"/>
-        <a:font typeface="Tunga" script="Knda"/>
-        <a:font typeface="Raavi" script="Guru"/>
-        <a:font typeface="Euphemia" script="Cans"/>
-        <a:font typeface="Plantagenet Cherokee" script="Cher"/>
-        <a:font typeface="Microsoft Yi Baiti" script="Yiii"/>
-        <a:font typeface="Microsoft Himalaya" script="Tibt"/>
-        <a:font typeface="MV Boli" script="Thaa"/>
-        <a:font typeface="Mangal" script="Deva"/>
-        <a:font typeface="Gautami" script="Telu"/>
-        <a:font typeface="Latha" script="Taml"/>
-        <a:font typeface="Estrangelo Edessa" script="Syrc"/>
-        <a:font typeface="Kalinga" script="Orya"/>
-        <a:font typeface="Kartika" script="Mlym"/>
-        <a:font typeface="DokChampa" script="Laoo"/>
-        <a:font typeface="Iskoola Pota" script="Sinh"/>
-        <a:font typeface="Mongolian Baiti" script="Mong"/>
-        <a:font typeface="Times New Roman" script="Viet"/>
-        <a:font typeface="Microsoft Uighur" script="Uigh"/>
-      </a:minorFont>
-    </a:fontScheme>
-    <a:fmtScheme name="Office">
-      <a:fillStyleLst>
-        <a:solidFill>
-          <a:schemeClr val="phClr"/>
-        </a:solidFill>
-        <a:gradFill rotWithShape="1">
-          <a:gsLst>
-            <a:gs pos="0">
-              <a:schemeClr val="phClr">
-                <a:tint val="50000"/>
-                <a:satMod val="300000"/>
-              </a:schemeClr>
-            </a:gs>
-            <a:gs pos="35000">
-              <a:schemeClr val="phClr">
-                <a:tint val="37000"/>
-                <a:satMod val="300000"/>
-              </a:schemeClr>
-            </a:gs>
-            <a:gs pos="100000">
-              <a:schemeClr val="phClr">
-                <a:tint val="15000"/>
-                <a:satMod val="350000"/>
-              </a:schemeClr>
-            </a:gs>
-          </a:gsLst>
-          <a:lin ang="16200000" scaled="1"/>
-        </a:gradFill>
-        <a:gradFill rotWithShape="1">
-          <a:gsLst>
-            <a:gs pos="0">
-              <a:schemeClr val="phClr">
-                <a:tint val="100000"/>
-                <a:shade val="100000"/>
-                <a:satMod val="130000"/>
-              </a:schemeClr>
-            </a:gs>
-            <a:gs pos="100000">
-              <a:schemeClr val="phClr">
-                <a:tint val="50000"/>
-                <a:shade val="100000"/>
-                <a:satMod val="350000"/>
-              </a:schemeClr>
-            </a:gs>
-          </a:gsLst>
-          <a:lin ang="16200000" scaled="0"/>
-        </a:gradFill>
-      </a:fillStyleLst>
-      <a:lnStyleLst>
-        <a:ln w="9525" algn="ctr" cap="flat" cmpd="sng">
-          <a:solidFill>
-            <a:schemeClr val="phClr">
-              <a:shade val="95000"/>
-              <a:satMod val="105000"/>
-            </a:schemeClr>
-          </a:solidFill>
-          <a:prstDash val="solid"/>
-        </a:ln>
-        <a:ln w="25400" algn="ctr" cap="flat" cmpd="sng">
-          <a:solidFill>
-            <a:schemeClr val="phClr"/>
-          </a:solidFill>
-          <a:prstDash val="solid"/>
-        </a:ln>
-        <a:ln w="38100" algn="ctr" cap="flat" cmpd="sng">
-          <a:solidFill>
-            <a:schemeClr val="phClr"/>
-          </a:solidFill>
-          <a:prstDash val="solid"/>
-        </a:ln>
-      </a:lnStyleLst>
-      <a:effectStyleLst>
-        <a:effectStyle>
-          <a:effectLst>
-            <a:outerShdw rotWithShape="0" dir="5400000" blurRad="40000" dist="20000">
-              <a:srgbClr val="000000">
-                <a:alpha val="38000"/>
-              </a:srgbClr>
-            </a:outerShdw>
-          </a:effectLst>
-        </a:effectStyle>
-        <a:effectStyle>
-          <a:effectLst>
-            <a:outerShdw rotWithShape="0" dir="5400000" blurRad="40000" dist="23000">
-              <a:srgbClr val="000000">
-                <a:alpha val="35000"/>
-              </a:srgbClr>
-            </a:outerShdw>
-          </a:effectLst>
-        </a:effectStyle>
-        <a:effectStyle>
-          <a:effectLst>
-            <a:outerShdw rotWithShape="0" dir="5400000" blurRad="40000" dist="23000">
-              <a:srgbClr val="000000">
-                <a:alpha val="35000"/>
-              </a:srgbClr>
-            </a:outerShdw>
-          </a:effectLst>
-          <a:scene3d>
-            <a:camera prst="orthographicFront">
-              <a:rot rev="0" lon="0" lat="0"/>
-            </a:camera>
-            <a:lightRig dir="t" rig="threePt">
-              <a:rot rev="1200000" lon="0" lat="0"/>
-            </a:lightRig>
-          </a:scene3d>
-          <a:sp3d>
-            <a:bevelB w="63500" h="25400"/>
-          </a:sp3d>
-        </a:effectStyle>
-      </a:effectStyleLst>
-      <a:bgFillStyleLst>
-        <a:solidFill>
-          <a:schemeClr val="phClr"/>
-        </a:solidFill>
-        <a:gradFill rotWithShape="1">
-          <a:gsLst>
-            <a:gs pos="0">
-              <a:schemeClr val="phClr">
-                <a:tint val="40000"/>
-                <a:satMod val="350000"/>
-              </a:schemeClr>
-            </a:gs>
-            <a:gs pos="40000">
-              <a:schemeClr val="phClr">
-                <a:tint val="45000"/>
-                <a:shade val="99000"/>
-                <a:satMod val="350000"/>
-              </a:schemeClr>
-            </a:gs>
-            <a:gs pos="100000">
-              <a:schemeClr val="phClr">
-                <a:shade val="20000"/>
-                <a:satMod val="255000"/>
-              </a:schemeClr>
-            </a:gs>
-          </a:gsLst>
-          <a:path path="circle">
-            <a:fillToRect t="-80000" b="180000" r="50000" l="50000"/>
-          </a:path>
-        </a:gradFill>
-        <a:gradFill rotWithShape="1">
-          <a:gsLst>
-            <a:gs pos="0">
-              <a:schemeClr val="phClr">
-                <a:tint val="80000"/>
-                <a:satMod val="300000"/>
-              </a:schemeClr>
-            </a:gs>
-            <a:gs pos="100000">
-              <a:schemeClr val="phClr">
-                <a:shade val="30000"/>
-                <a:satMod val="200000"/>
-              </a:schemeClr>
-            </a:gs>
-          </a:gsLst>
-          <a:path path="circle">
-            <a:fillToRect t="50000" b="50000" r="50000" l="50000"/>
-          </a:path>
-        </a:gradFill>
-      </a:bgFillStyleLst>
-    </a:fmtScheme>
-  </a:themeElements>
+  <a:objectDefaults/>
+  <a:extraClrSchemeLst/>
 </a:theme>
 </file>
</xml_diff>